<commit_message>
update IHE FHIR Brief
</commit_message>
<xml_diff>
--- a/Presentations/IHE-FHIR-Brief.pptx
+++ b/Presentations/IHE-FHIR-Brief.pptx
@@ -5,10 +5,10 @@
     <p:sldMasterId id="2147483688" r:id="rId1"/>
   </p:sldMasterIdLst>
   <p:notesMasterIdLst>
-    <p:notesMasterId r:id="rId18"/>
+    <p:notesMasterId r:id="rId20"/>
   </p:notesMasterIdLst>
   <p:handoutMasterIdLst>
-    <p:handoutMasterId r:id="rId19"/>
+    <p:handoutMasterId r:id="rId21"/>
   </p:handoutMasterIdLst>
   <p:sldIdLst>
     <p:sldId id="2351" r:id="rId2"/>
@@ -17,16 +17,18 @@
     <p:sldId id="2344" r:id="rId5"/>
     <p:sldId id="2349" r:id="rId6"/>
     <p:sldId id="2350" r:id="rId7"/>
-    <p:sldId id="272" r:id="rId8"/>
-    <p:sldId id="2347" r:id="rId9"/>
-    <p:sldId id="292" r:id="rId10"/>
-    <p:sldId id="2352" r:id="rId11"/>
-    <p:sldId id="302" r:id="rId12"/>
-    <p:sldId id="306" r:id="rId13"/>
-    <p:sldId id="284" r:id="rId14"/>
-    <p:sldId id="2348" r:id="rId15"/>
-    <p:sldId id="310" r:id="rId16"/>
-    <p:sldId id="2331" r:id="rId17"/>
+    <p:sldId id="2353" r:id="rId8"/>
+    <p:sldId id="272" r:id="rId9"/>
+    <p:sldId id="2347" r:id="rId10"/>
+    <p:sldId id="292" r:id="rId11"/>
+    <p:sldId id="2352" r:id="rId12"/>
+    <p:sldId id="2354" r:id="rId13"/>
+    <p:sldId id="302" r:id="rId14"/>
+    <p:sldId id="306" r:id="rId15"/>
+    <p:sldId id="284" r:id="rId16"/>
+    <p:sldId id="2348" r:id="rId17"/>
+    <p:sldId id="310" r:id="rId18"/>
+    <p:sldId id="2331" r:id="rId19"/>
   </p:sldIdLst>
   <p:sldSz cx="10058400" cy="7772400"/>
   <p:notesSz cx="7053263" cy="9356725"/>
@@ -1723,7 +1725,7 @@
                 <a:tabLst/>
                 <a:defRPr/>
               </a:pPr>
-              <a:t>7</a:t>
+              <a:t>8</a:t>
             </a:fld>
             <a:endParaRPr kumimoji="0" lang="en-US" sz="1200" b="0" i="0" u="none" strike="noStrike" kern="1200" cap="none" spc="0" normalizeH="0" baseline="0" noProof="0">
               <a:ln>
@@ -2006,9 +2008,46 @@
             </a:r>
           </a:p>
           <a:p>
+            <a:pPr algn="l"/>
             <a:br>
               <a:rPr lang="en-US" dirty="0"/>
             </a:br>
+            <a:r>
+              <a:rPr lang="en-US" b="0" i="0" dirty="0">
+                <a:solidFill>
+                  <a:srgbClr val="202122"/>
+                </a:solidFill>
+                <a:effectLst/>
+                <a:latin typeface="Arial" panose="020B0604020202020204" pitchFamily="34" charset="0"/>
+              </a:rPr>
+              <a:t> [IPS] </a:t>
+            </a:r>
+            <a:r>
+              <a:rPr lang="en-US" b="0" i="0" u="none" strike="noStrike" dirty="0">
+                <a:solidFill>
+                  <a:srgbClr val="0645AD"/>
+                </a:solidFill>
+                <a:effectLst/>
+                <a:latin typeface="Arial" panose="020B0604020202020204" pitchFamily="34" charset="0"/>
+                <a:hlinkClick r:id="rId8" tooltip="International Patient Summary"/>
+              </a:rPr>
+              <a:t>International Patient Summary</a:t>
+            </a:r>
+            <a:r>
+              <a:rPr lang="en-US" b="0" i="0" dirty="0">
+                <a:solidFill>
+                  <a:srgbClr val="202122"/>
+                </a:solidFill>
+                <a:effectLst/>
+                <a:latin typeface="Arial" panose="020B0604020202020204" pitchFamily="34" charset="0"/>
+              </a:rPr>
+              <a:t> profiles IPS based on HL7's IPS Implementation Guides. </a:t>
+            </a:r>
+          </a:p>
+          <a:p>
+            <a:endParaRPr lang="en-US" dirty="0"/>
+          </a:p>
+          <a:p>
             <a:r>
               <a:rPr lang="en-US" sz="1200" b="0" i="0" kern="1200" dirty="0">
                 <a:solidFill>
@@ -2030,7 +2069,7 @@
                 <a:latin typeface="Arial" charset="0"/>
                 <a:ea typeface="+mn-ea"/>
                 <a:cs typeface="Arial" charset="0"/>
-                <a:hlinkClick r:id="rId8" tooltip="Paramedicine Care Summary"/>
+                <a:hlinkClick r:id="rId9" tooltip="Paramedicine Care Summary"/>
               </a:rPr>
               <a:t>Paramedicine Care Summary</a:t>
             </a:r>
@@ -2096,7 +2135,7 @@
                 <a:latin typeface="Arial" charset="0"/>
                 <a:ea typeface="+mn-ea"/>
                 <a:cs typeface="Arial" charset="0"/>
-                <a:hlinkClick r:id="rId9" tooltip="Point-of-Care Medical Device Tracking"/>
+                <a:hlinkClick r:id="rId10" tooltip="Point-of-Care Medical Device Tracking"/>
               </a:rPr>
               <a:t>Point-of-Care Medical Device Tracking</a:t>
             </a:r>
@@ -2138,7 +2177,7 @@
                 <a:latin typeface="Arial" charset="0"/>
                 <a:ea typeface="+mn-ea"/>
                 <a:cs typeface="Arial" charset="0"/>
-                <a:hlinkClick r:id="rId10" tooltip="Query for Existing Data for Mobile"/>
+                <a:hlinkClick r:id="rId11" tooltip="Query for Existing Data for Mobile"/>
               </a:rPr>
               <a:t>Query for Existing Data for Mobile</a:t>
             </a:r>
@@ -2204,7 +2243,7 @@
                 <a:latin typeface="Arial" charset="0"/>
                 <a:ea typeface="+mn-ea"/>
                 <a:cs typeface="Arial" charset="0"/>
-                <a:hlinkClick r:id="rId11" tooltip="Reconciliation of Clinical Content and Care Providers"/>
+                <a:hlinkClick r:id="rId12" tooltip="Reconciliation of Clinical Content and Care Providers"/>
               </a:rPr>
               <a:t>Reconciliation of Clinical Content and Care Providers</a:t>
             </a:r>
@@ -2246,7 +2285,7 @@
                 <a:latin typeface="Arial" charset="0"/>
                 <a:ea typeface="+mn-ea"/>
                 <a:cs typeface="Arial" charset="0"/>
-                <a:hlinkClick r:id="rId12" tooltip="Routine Interfacility Patient Transport"/>
+                <a:hlinkClick r:id="rId13" tooltip="Routine Interfacility Patient Transport"/>
               </a:rPr>
               <a:t>Routine Interfacility Patient Transport</a:t>
             </a:r>
@@ -2294,7 +2333,7 @@
               <a:pPr>
                 <a:defRPr/>
               </a:pPr>
-              <a:t>9</a:t>
+              <a:t>10</a:t>
             </a:fld>
             <a:endParaRPr lang="en-US"/>
           </a:p>
@@ -2426,7 +2465,7 @@
               <a:pPr>
                 <a:defRPr/>
               </a:pPr>
-              <a:t>10</a:t>
+              <a:t>11</a:t>
             </a:fld>
             <a:endParaRPr lang="en-US"/>
           </a:p>
@@ -2490,113 +2529,36 @@
           <a:lstStyle/>
           <a:p>
             <a:r>
-              <a:rPr lang="en-US" sz="1200" b="0" i="0" kern="1200" dirty="0">
-                <a:solidFill>
-                  <a:schemeClr val="tx1"/>
+              <a:rPr lang="en-US" b="0" i="0" dirty="0">
+                <a:solidFill>
+                  <a:srgbClr val="202122"/>
                 </a:solidFill>
                 <a:effectLst/>
-                <a:latin typeface="Arial" charset="0"/>
-                <a:ea typeface="+mn-ea"/>
-                <a:cs typeface="Arial" charset="0"/>
-              </a:rPr>
-              <a:t> [MMA] </a:t>
-            </a:r>
-            <a:r>
-              <a:rPr lang="en-US" sz="1200" b="0" i="0" u="none" strike="noStrike" kern="1200" dirty="0">
-                <a:solidFill>
-                  <a:schemeClr val="tx1"/>
+                <a:latin typeface="Arial" panose="020B0604020202020204" pitchFamily="34" charset="0"/>
+              </a:rPr>
+              <a:t> [RPC] - </a:t>
+            </a:r>
+            <a:r>
+              <a:rPr lang="en-US" b="0" i="0" u="none" strike="noStrike" dirty="0">
+                <a:solidFill>
+                  <a:srgbClr val="0645AD"/>
                 </a:solidFill>
                 <a:effectLst/>
-                <a:latin typeface="Arial" charset="0"/>
-                <a:ea typeface="+mn-ea"/>
-                <a:cs typeface="Arial" charset="0"/>
-                <a:hlinkClick r:id="rId3" tooltip="Mobile Medication Administration"/>
-              </a:rPr>
-              <a:t>Mobile Medication Administration</a:t>
-            </a:r>
-            <a:r>
-              <a:rPr lang="en-US" sz="1200" b="0" i="0" kern="1200" dirty="0">
-                <a:solidFill>
-                  <a:schemeClr val="tx1"/>
+                <a:latin typeface="Arial" panose="020B0604020202020204" pitchFamily="34" charset="0"/>
+                <a:hlinkClick r:id="rId3" tooltip="Radiology Pathology Concordance"/>
+              </a:rPr>
+              <a:t>Radiology Pathology Concordance</a:t>
+            </a:r>
+            <a:r>
+              <a:rPr lang="en-US" b="0" i="0" dirty="0">
+                <a:solidFill>
+                  <a:srgbClr val="202122"/>
                 </a:solidFill>
                 <a:effectLst/>
-                <a:latin typeface="Arial" charset="0"/>
-                <a:ea typeface="+mn-ea"/>
-                <a:cs typeface="Arial" charset="0"/>
-              </a:rPr>
-              <a:t> connects EHRs with devices such as smartphones and smart pill boxes using RESTful web services. </a:t>
-            </a:r>
-          </a:p>
-          <a:p>
-            <a:br>
-              <a:rPr lang="en-US" dirty="0"/>
-            </a:br>
-            <a:r>
-              <a:rPr lang="en-US" sz="1200" b="0" i="0" kern="1200" dirty="0">
-                <a:solidFill>
-                  <a:schemeClr val="tx1"/>
-                </a:solidFill>
-                <a:effectLst/>
-                <a:latin typeface="Arial" charset="0"/>
-                <a:ea typeface="+mn-ea"/>
-                <a:cs typeface="Arial" charset="0"/>
-              </a:rPr>
-              <a:t> [UBP] </a:t>
-            </a:r>
-            <a:r>
-              <a:rPr lang="en-US" sz="1200" b="0" i="0" u="none" strike="noStrike" kern="1200" dirty="0">
-                <a:solidFill>
-                  <a:schemeClr val="tx1"/>
-                </a:solidFill>
-                <a:effectLst/>
-                <a:latin typeface="Arial" charset="0"/>
-                <a:ea typeface="+mn-ea"/>
-                <a:cs typeface="Arial" charset="0"/>
-                <a:hlinkClick r:id="rId4" tooltip="Uniform Barcode Processing"/>
-              </a:rPr>
-              <a:t>Uniform Barcode Processing</a:t>
-            </a:r>
-            <a:r>
-              <a:rPr lang="en-US" sz="1200" b="0" i="0" kern="1200" dirty="0">
-                <a:solidFill>
-                  <a:schemeClr val="tx1"/>
-                </a:solidFill>
-                <a:effectLst/>
-                <a:latin typeface="Arial" charset="0"/>
-                <a:ea typeface="+mn-ea"/>
-                <a:cs typeface="Arial" charset="0"/>
-              </a:rPr>
-              <a:t> returns a FHIR resource (for a medication, device, patient, </a:t>
-            </a:r>
-            <a:r>
-              <a:rPr lang="en-US" sz="1200" b="0" i="0" kern="1200" dirty="0" err="1">
-                <a:solidFill>
-                  <a:schemeClr val="tx1"/>
-                </a:solidFill>
-                <a:effectLst/>
-                <a:latin typeface="Arial" charset="0"/>
-                <a:ea typeface="+mn-ea"/>
-                <a:cs typeface="Arial" charset="0"/>
-              </a:rPr>
-              <a:t>etc</a:t>
-            </a:r>
-            <a:r>
-              <a:rPr lang="en-US" sz="1200" b="0" i="0" kern="1200" dirty="0">
-                <a:solidFill>
-                  <a:schemeClr val="tx1"/>
-                </a:solidFill>
-                <a:effectLst/>
-                <a:latin typeface="Arial" charset="0"/>
-                <a:ea typeface="+mn-ea"/>
-                <a:cs typeface="Arial" charset="0"/>
-              </a:rPr>
-              <a:t>) corresponding to a submitted barcode.</a:t>
-            </a:r>
-          </a:p>
-          <a:p>
-            <a:br>
-              <a:rPr lang="en-US" dirty="0"/>
-            </a:br>
+                <a:latin typeface="Arial" panose="020B0604020202020204" pitchFamily="34" charset="0"/>
+              </a:rPr>
+              <a:t> describes how discrete data elements are collected from structured reports to create an integrated report, where concordance of results is assessed, and reports are shared to an EMR or system in use by a health facility. </a:t>
+            </a:r>
             <a:endParaRPr lang="en-US" dirty="0"/>
           </a:p>
         </p:txBody>
@@ -2624,7 +2586,7 @@
               <a:pPr>
                 <a:defRPr/>
               </a:pPr>
-              <a:t>11</a:t>
+              <a:t>12</a:t>
             </a:fld>
             <a:endParaRPr lang="en-US"/>
           </a:p>
@@ -2633,7 +2595,7 @@
     </p:spTree>
     <p:extLst>
       <p:ext uri="{BB962C8B-B14F-4D97-AF65-F5344CB8AC3E}">
-        <p14:creationId xmlns:p14="http://schemas.microsoft.com/office/powerpoint/2010/main" val="3350225674"/>
+        <p14:creationId xmlns:p14="http://schemas.microsoft.com/office/powerpoint/2010/main" val="4048092435"/>
       </p:ext>
     </p:extLst>
   </p:cSld>
@@ -2697,7 +2659,7 @@
                 <a:ea typeface="+mn-ea"/>
                 <a:cs typeface="Arial" charset="0"/>
               </a:rPr>
-              <a:t> [BFDR-E] </a:t>
+              <a:t> [MMA] </a:t>
             </a:r>
             <a:r>
               <a:rPr lang="en-US" sz="1200" b="0" i="0" u="none" strike="noStrike" kern="1200" dirty="0">
@@ -2708,9 +2670,9 @@
                 <a:latin typeface="Arial" charset="0"/>
                 <a:ea typeface="+mn-ea"/>
                 <a:cs typeface="Arial" charset="0"/>
-                <a:hlinkClick r:id="rId3" tooltip="Birth and Fetal Death Reporting Enhanced Profile"/>
-              </a:rPr>
-              <a:t>Birth and Fetal Death Reporting Enhanced Profile</a:t>
+                <a:hlinkClick r:id="rId3" tooltip="Mobile Medication Administration"/>
+              </a:rPr>
+              <a:t>Mobile Medication Administration</a:t>
             </a:r>
             <a:r>
               <a:rPr lang="en-US" sz="1200" b="0" i="0" kern="1200" dirty="0">
@@ -2722,21 +2684,13 @@
                 <a:ea typeface="+mn-ea"/>
                 <a:cs typeface="Arial" charset="0"/>
               </a:rPr>
-              <a:t> captures and communicates information for birth and fetal death reporting for vital registration purposes. </a:t>
-            </a:r>
-          </a:p>
-          <a:p>
-            <a:endParaRPr lang="en-US" sz="1200" b="0" i="0" kern="1200" dirty="0">
-              <a:solidFill>
-                <a:schemeClr val="tx1"/>
-              </a:solidFill>
-              <a:effectLst/>
-              <a:latin typeface="Arial" charset="0"/>
-              <a:ea typeface="+mn-ea"/>
-              <a:cs typeface="Arial" charset="0"/>
-            </a:endParaRPr>
-          </a:p>
-          <a:p>
+              <a:t> connects EHRs with devices such as smartphones and smart pill boxes using RESTful web services. </a:t>
+            </a:r>
+          </a:p>
+          <a:p>
+            <a:br>
+              <a:rPr lang="en-US" dirty="0"/>
+            </a:br>
             <a:r>
               <a:rPr lang="en-US" sz="1200" b="0" i="0" kern="1200" dirty="0">
                 <a:solidFill>
@@ -2747,7 +2701,7 @@
                 <a:ea typeface="+mn-ea"/>
                 <a:cs typeface="Arial" charset="0"/>
               </a:rPr>
-              <a:t> [CCG] </a:t>
+              <a:t> [UBP] </a:t>
             </a:r>
             <a:r>
               <a:rPr lang="en-US" sz="1200" b="0" i="0" u="none" strike="noStrike" kern="1200" dirty="0">
@@ -2758,9 +2712,9 @@
                 <a:latin typeface="Arial" charset="0"/>
                 <a:ea typeface="+mn-ea"/>
                 <a:cs typeface="Arial" charset="0"/>
-                <a:hlinkClick r:id="rId4" tooltip="Computable Care Guidelines"/>
-              </a:rPr>
-              <a:t>Computable Care Guidelines</a:t>
+                <a:hlinkClick r:id="rId4" tooltip="Uniform Barcode Processing"/>
+              </a:rPr>
+              <a:t>Uniform Barcode Processing</a:t>
             </a:r>
             <a:r>
               <a:rPr lang="en-US" sz="1200" b="0" i="0" kern="1200" dirty="0">
@@ -2772,23 +2726,10 @@
                 <a:ea typeface="+mn-ea"/>
                 <a:cs typeface="Arial" charset="0"/>
               </a:rPr>
-              <a:t> encodes care guidelines in a format that can be understood by health software </a:t>
-            </a:r>
-          </a:p>
-          <a:p>
-            <a:endParaRPr lang="en-US" sz="1200" b="0" i="0" kern="1200" dirty="0">
-              <a:solidFill>
-                <a:schemeClr val="tx1"/>
-              </a:solidFill>
-              <a:effectLst/>
-              <a:latin typeface="Arial" charset="0"/>
-              <a:ea typeface="+mn-ea"/>
-              <a:cs typeface="Arial" charset="0"/>
-            </a:endParaRPr>
-          </a:p>
-          <a:p>
-            <a:r>
-              <a:rPr lang="en-US" sz="1200" b="0" i="0" kern="1200" dirty="0">
+              <a:t> returns a FHIR resource (for a medication, device, patient, </a:t>
+            </a:r>
+            <a:r>
+              <a:rPr lang="en-US" sz="1200" b="0" i="0" kern="1200" dirty="0" err="1">
                 <a:solidFill>
                   <a:schemeClr val="tx1"/>
                 </a:solidFill>
@@ -2797,10 +2738,10 @@
                 <a:ea typeface="+mn-ea"/>
                 <a:cs typeface="Arial" charset="0"/>
               </a:rPr>
-              <a:t> [</a:t>
-            </a:r>
-            <a:r>
-              <a:rPr lang="en-US" sz="1200" b="0" i="0" kern="1200" dirty="0" err="1">
+              <a:t>etc</a:t>
+            </a:r>
+            <a:r>
+              <a:rPr lang="en-US" sz="1200" b="0" i="0" kern="1200" dirty="0">
                 <a:solidFill>
                   <a:schemeClr val="tx1"/>
                 </a:solidFill>
@@ -2809,357 +2750,8 @@
                 <a:ea typeface="+mn-ea"/>
                 <a:cs typeface="Arial" charset="0"/>
               </a:rPr>
-              <a:t>mADX</a:t>
-            </a:r>
-            <a:r>
-              <a:rPr lang="en-US" sz="1200" b="0" i="0" kern="1200" dirty="0">
-                <a:solidFill>
-                  <a:schemeClr val="tx1"/>
-                </a:solidFill>
-                <a:effectLst/>
-                <a:latin typeface="Arial" charset="0"/>
-                <a:ea typeface="+mn-ea"/>
-                <a:cs typeface="Arial" charset="0"/>
-              </a:rPr>
-              <a:t>] </a:t>
-            </a:r>
-            <a:r>
-              <a:rPr lang="en-US" sz="1200" b="0" i="0" u="none" strike="noStrike" kern="1200" dirty="0">
-                <a:solidFill>
-                  <a:schemeClr val="tx1"/>
-                </a:solidFill>
-                <a:effectLst/>
-                <a:latin typeface="Arial" charset="0"/>
-                <a:ea typeface="+mn-ea"/>
-                <a:cs typeface="Arial" charset="0"/>
-                <a:hlinkClick r:id="rId5" tooltip="Mobile Aggregate Data Exchange (mADX)"/>
-              </a:rPr>
-              <a:t>Mobile Aggregate Data Exchange (</a:t>
-            </a:r>
-            <a:r>
-              <a:rPr lang="en-US" sz="1200" b="0" i="0" u="none" strike="noStrike" kern="1200" dirty="0" err="1">
-                <a:solidFill>
-                  <a:schemeClr val="tx1"/>
-                </a:solidFill>
-                <a:effectLst/>
-                <a:latin typeface="Arial" charset="0"/>
-                <a:ea typeface="+mn-ea"/>
-                <a:cs typeface="Arial" charset="0"/>
-                <a:hlinkClick r:id="rId5" tooltip="Mobile Aggregate Data Exchange (mADX)"/>
-              </a:rPr>
-              <a:t>mADX</a:t>
-            </a:r>
-            <a:r>
-              <a:rPr lang="en-US" sz="1200" b="0" i="0" u="none" strike="noStrike" kern="1200" dirty="0">
-                <a:solidFill>
-                  <a:schemeClr val="tx1"/>
-                </a:solidFill>
-                <a:effectLst/>
-                <a:latin typeface="Arial" charset="0"/>
-                <a:ea typeface="+mn-ea"/>
-                <a:cs typeface="Arial" charset="0"/>
-                <a:hlinkClick r:id="rId5" tooltip="Mobile Aggregate Data Exchange (mADX)"/>
-              </a:rPr>
-              <a:t>)</a:t>
-            </a:r>
-            <a:r>
-              <a:rPr lang="en-US" sz="1200" b="0" i="0" kern="1200" dirty="0">
-                <a:solidFill>
-                  <a:schemeClr val="tx1"/>
-                </a:solidFill>
-                <a:effectLst/>
-                <a:latin typeface="Arial" charset="0"/>
-                <a:ea typeface="+mn-ea"/>
-                <a:cs typeface="Arial" charset="0"/>
-              </a:rPr>
-              <a:t> supports interoperable public health reporting of aggregate health data. </a:t>
-            </a:r>
-          </a:p>
-          <a:p>
-            <a:endParaRPr lang="en-US" sz="1200" b="0" i="0" kern="1200" dirty="0">
-              <a:solidFill>
-                <a:schemeClr val="tx1"/>
-              </a:solidFill>
-              <a:effectLst/>
-              <a:latin typeface="Arial" charset="0"/>
-              <a:ea typeface="+mn-ea"/>
-              <a:cs typeface="Arial" charset="0"/>
-            </a:endParaRPr>
-          </a:p>
-          <a:p>
-            <a:r>
-              <a:rPr lang="en-US" sz="1200" b="0" i="0" kern="1200" dirty="0">
-                <a:solidFill>
-                  <a:schemeClr val="tx1"/>
-                </a:solidFill>
-                <a:effectLst/>
-                <a:latin typeface="Arial" charset="0"/>
-                <a:ea typeface="+mn-ea"/>
-                <a:cs typeface="Arial" charset="0"/>
-              </a:rPr>
-              <a:t> [</a:t>
-            </a:r>
-            <a:r>
-              <a:rPr lang="en-US" sz="1200" b="0" i="0" kern="1200" dirty="0" err="1">
-                <a:solidFill>
-                  <a:schemeClr val="tx1"/>
-                </a:solidFill>
-                <a:effectLst/>
-                <a:latin typeface="Arial" charset="0"/>
-                <a:ea typeface="+mn-ea"/>
-                <a:cs typeface="Arial" charset="0"/>
-              </a:rPr>
-              <a:t>mRFD</a:t>
-            </a:r>
-            <a:r>
-              <a:rPr lang="en-US" sz="1200" b="0" i="0" kern="1200" dirty="0">
-                <a:solidFill>
-                  <a:schemeClr val="tx1"/>
-                </a:solidFill>
-                <a:effectLst/>
-                <a:latin typeface="Arial" charset="0"/>
-                <a:ea typeface="+mn-ea"/>
-                <a:cs typeface="Arial" charset="0"/>
-              </a:rPr>
-              <a:t>] </a:t>
-            </a:r>
-            <a:r>
-              <a:rPr lang="en-US" sz="1200" b="0" i="0" u="none" strike="noStrike" kern="1200" dirty="0">
-                <a:solidFill>
-                  <a:schemeClr val="tx1"/>
-                </a:solidFill>
-                <a:effectLst/>
-                <a:latin typeface="Arial" charset="0"/>
-                <a:ea typeface="+mn-ea"/>
-                <a:cs typeface="Arial" charset="0"/>
-                <a:hlinkClick r:id="rId6" tooltip="Mobile Retrieve Form for Data Capture"/>
-              </a:rPr>
-              <a:t>Mobile Retrieve Form for Data Capture</a:t>
-            </a:r>
-            <a:r>
-              <a:rPr lang="en-US" sz="1200" b="0" i="0" kern="1200" dirty="0">
-                <a:solidFill>
-                  <a:schemeClr val="tx1"/>
-                </a:solidFill>
-                <a:effectLst/>
-                <a:latin typeface="Arial" charset="0"/>
-                <a:ea typeface="+mn-ea"/>
-                <a:cs typeface="Arial" charset="0"/>
-              </a:rPr>
-              <a:t> describes the exchange of context data to allow a seamless form launch with supporting clinical context. </a:t>
-            </a:r>
-          </a:p>
-          <a:p>
-            <a:endParaRPr lang="en-US" sz="1200" b="0" i="0" kern="1200" dirty="0">
-              <a:solidFill>
-                <a:schemeClr val="tx1"/>
-              </a:solidFill>
-              <a:effectLst/>
-              <a:latin typeface="Arial" charset="0"/>
-              <a:ea typeface="+mn-ea"/>
-              <a:cs typeface="Arial" charset="0"/>
-            </a:endParaRPr>
-          </a:p>
-          <a:p>
-            <a:r>
-              <a:rPr lang="en-US" sz="1200" b="0" i="0" kern="1200" dirty="0">
-                <a:solidFill>
-                  <a:schemeClr val="tx1"/>
-                </a:solidFill>
-                <a:effectLst/>
-                <a:latin typeface="Arial" charset="0"/>
-                <a:ea typeface="+mn-ea"/>
-                <a:cs typeface="Arial" charset="0"/>
-              </a:rPr>
-              <a:t> [PRQ] </a:t>
-            </a:r>
-            <a:r>
-              <a:rPr lang="en-US" sz="1200" b="0" i="0" u="none" strike="noStrike" kern="1200" dirty="0">
-                <a:solidFill>
-                  <a:schemeClr val="tx1"/>
-                </a:solidFill>
-                <a:effectLst/>
-                <a:latin typeface="Arial" charset="0"/>
-                <a:ea typeface="+mn-ea"/>
-                <a:cs typeface="Arial" charset="0"/>
-                <a:hlinkClick r:id="rId7" tooltip="Prescription Repository Query"/>
-              </a:rPr>
-              <a:t>Prescription Repository Query</a:t>
-            </a:r>
-            <a:r>
-              <a:rPr lang="en-US" sz="1200" b="0" i="0" kern="1200" dirty="0">
-                <a:solidFill>
-                  <a:schemeClr val="tx1"/>
-                </a:solidFill>
-                <a:effectLst/>
-                <a:latin typeface="Arial" charset="0"/>
-                <a:ea typeface="+mn-ea"/>
-                <a:cs typeface="Arial" charset="0"/>
-              </a:rPr>
-              <a:t> (PRQ) defines a Retrieve query and HTTP GET transaction that specifies the dispensed medication history information that should be seen by primary care givers to assist in making an informed decision prior to prescribing additional medications to a patient. </a:t>
-            </a:r>
-          </a:p>
-          <a:p>
-            <a:br>
-              <a:rPr lang="en-US" dirty="0"/>
-            </a:br>
-            <a:r>
-              <a:rPr lang="en-US" sz="1200" b="0" i="0" kern="1200" dirty="0">
-                <a:solidFill>
-                  <a:schemeClr val="tx1"/>
-                </a:solidFill>
-                <a:effectLst/>
-                <a:latin typeface="Arial" charset="0"/>
-                <a:ea typeface="+mn-ea"/>
-                <a:cs typeface="Arial" charset="0"/>
-              </a:rPr>
-              <a:t> [QORE] </a:t>
-            </a:r>
-            <a:r>
-              <a:rPr lang="en-US" sz="1200" b="0" i="0" u="none" strike="noStrike" kern="1200" dirty="0">
-                <a:solidFill>
-                  <a:schemeClr val="tx1"/>
-                </a:solidFill>
-                <a:effectLst/>
-                <a:latin typeface="Arial" charset="0"/>
-                <a:ea typeface="+mn-ea"/>
-                <a:cs typeface="Arial" charset="0"/>
-                <a:hlinkClick r:id="rId8" tooltip="Quality Outcome Reporting for EMS"/>
-              </a:rPr>
-              <a:t>Quality Outcome Reporting for EMS</a:t>
-            </a:r>
-            <a:r>
-              <a:rPr lang="en-US" sz="1200" b="0" i="0" kern="1200" dirty="0">
-                <a:solidFill>
-                  <a:schemeClr val="tx1"/>
-                </a:solidFill>
-                <a:effectLst/>
-                <a:latin typeface="Arial" charset="0"/>
-                <a:ea typeface="+mn-ea"/>
-                <a:cs typeface="Arial" charset="0"/>
-              </a:rPr>
-              <a:t> describes content used for continuity of care between the emergency transport scene records and destination hospital where the emergency will be treated. </a:t>
-            </a:r>
-          </a:p>
-          <a:p>
-            <a:endParaRPr lang="en-US" sz="1200" b="0" i="0" kern="1200" dirty="0">
-              <a:solidFill>
-                <a:schemeClr val="tx1"/>
-              </a:solidFill>
-              <a:effectLst/>
-              <a:latin typeface="Arial" charset="0"/>
-              <a:ea typeface="+mn-ea"/>
-              <a:cs typeface="Arial" charset="0"/>
-            </a:endParaRPr>
-          </a:p>
-          <a:p>
-            <a:r>
-              <a:rPr lang="en-US" sz="1200" b="0" i="0" kern="1200" dirty="0">
-                <a:solidFill>
-                  <a:schemeClr val="tx1"/>
-                </a:solidFill>
-                <a:effectLst/>
-                <a:latin typeface="Arial" charset="0"/>
-                <a:ea typeface="+mn-ea"/>
-                <a:cs typeface="Arial" charset="0"/>
-              </a:rPr>
-              <a:t> [VRDR] </a:t>
-            </a:r>
-            <a:r>
-              <a:rPr lang="en-US" sz="1200" b="0" i="0" u="none" strike="noStrike" kern="1200" dirty="0">
-                <a:solidFill>
-                  <a:schemeClr val="tx1"/>
-                </a:solidFill>
-                <a:effectLst/>
-                <a:latin typeface="Arial" charset="0"/>
-                <a:ea typeface="+mn-ea"/>
-                <a:cs typeface="Arial" charset="0"/>
-                <a:hlinkClick r:id="rId9" tooltip="Vital Records Death Reporting"/>
-              </a:rPr>
-              <a:t>Vital Records Death Reporting</a:t>
-            </a:r>
-            <a:r>
-              <a:rPr lang="en-US" sz="1200" b="0" i="0" kern="1200" dirty="0">
-                <a:solidFill>
-                  <a:schemeClr val="tx1"/>
-                </a:solidFill>
-                <a:effectLst/>
-                <a:latin typeface="Arial" charset="0"/>
-                <a:ea typeface="+mn-ea"/>
-                <a:cs typeface="Arial" charset="0"/>
-              </a:rPr>
-              <a:t> defines a Retrieve Form for Data Capture (RFD) content profile that will specify derivation of source content from a medical summary document. by defining requirements for form filler content and form manager handling of the content. </a:t>
-            </a:r>
-          </a:p>
-          <a:p>
-            <a:br>
-              <a:rPr lang="en-US" dirty="0"/>
-            </a:br>
-            <a:endParaRPr lang="en-US" sz="1200" b="0" i="0" kern="1200" dirty="0">
-              <a:solidFill>
-                <a:schemeClr val="tx1"/>
-              </a:solidFill>
-              <a:effectLst/>
-              <a:latin typeface="Arial" charset="0"/>
-              <a:ea typeface="+mn-ea"/>
-              <a:cs typeface="Arial" charset="0"/>
-            </a:endParaRPr>
-          </a:p>
-          <a:p>
-            <a:br>
-              <a:rPr lang="en-US" dirty="0"/>
-            </a:br>
-            <a:endParaRPr lang="en-US" sz="1200" b="0" i="0" kern="1200" dirty="0">
-              <a:solidFill>
-                <a:schemeClr val="tx1"/>
-              </a:solidFill>
-              <a:effectLst/>
-              <a:latin typeface="Arial" charset="0"/>
-              <a:ea typeface="+mn-ea"/>
-              <a:cs typeface="Arial" charset="0"/>
-            </a:endParaRPr>
-          </a:p>
-          <a:p>
-            <a:br>
-              <a:rPr lang="en-US" dirty="0"/>
-            </a:br>
-            <a:endParaRPr lang="en-US" sz="1200" b="0" i="0" kern="1200" dirty="0">
-              <a:solidFill>
-                <a:schemeClr val="tx1"/>
-              </a:solidFill>
-              <a:effectLst/>
-              <a:latin typeface="Arial" charset="0"/>
-              <a:ea typeface="+mn-ea"/>
-              <a:cs typeface="Arial" charset="0"/>
-            </a:endParaRPr>
-          </a:p>
-          <a:p>
-            <a:br>
-              <a:rPr lang="en-US" dirty="0"/>
-            </a:br>
-            <a:endParaRPr lang="en-US" sz="1200" b="0" i="0" kern="1200" dirty="0">
-              <a:solidFill>
-                <a:schemeClr val="tx1"/>
-              </a:solidFill>
-              <a:effectLst/>
-              <a:latin typeface="Arial" charset="0"/>
-              <a:ea typeface="+mn-ea"/>
-              <a:cs typeface="Arial" charset="0"/>
-            </a:endParaRPr>
-          </a:p>
-          <a:p>
-            <a:br>
-              <a:rPr lang="en-US" dirty="0"/>
-            </a:br>
-            <a:endParaRPr lang="en-US" sz="1200" b="0" i="0" kern="1200" dirty="0">
-              <a:solidFill>
-                <a:schemeClr val="tx1"/>
-              </a:solidFill>
-              <a:effectLst/>
-              <a:latin typeface="Arial" charset="0"/>
-              <a:ea typeface="+mn-ea"/>
-              <a:cs typeface="Arial" charset="0"/>
-            </a:endParaRPr>
+              <a:t>) corresponding to a submitted barcode.</a:t>
+            </a:r>
           </a:p>
           <a:p>
             <a:br>
@@ -3192,7 +2784,7 @@
               <a:pPr>
                 <a:defRPr/>
               </a:pPr>
-              <a:t>12</a:t>
+              <a:t>13</a:t>
             </a:fld>
             <a:endParaRPr lang="en-US"/>
           </a:p>
@@ -3201,7 +2793,7 @@
     </p:spTree>
     <p:extLst>
       <p:ext uri="{BB962C8B-B14F-4D97-AF65-F5344CB8AC3E}">
-        <p14:creationId xmlns:p14="http://schemas.microsoft.com/office/powerpoint/2010/main" val="1909852158"/>
+        <p14:creationId xmlns:p14="http://schemas.microsoft.com/office/powerpoint/2010/main" val="3350225674"/>
       </p:ext>
     </p:extLst>
   </p:cSld>
@@ -3265,7 +2857,7 @@
                 <a:ea typeface="+mn-ea"/>
                 <a:cs typeface="Arial" charset="0"/>
               </a:rPr>
-              <a:t> [SOLE] </a:t>
+              <a:t> [BFDR-E] </a:t>
             </a:r>
             <a:r>
               <a:rPr lang="en-US" sz="1200" b="0" i="0" u="none" strike="noStrike" kern="1200" dirty="0">
@@ -3276,9 +2868,9 @@
                 <a:latin typeface="Arial" charset="0"/>
                 <a:ea typeface="+mn-ea"/>
                 <a:cs typeface="Arial" charset="0"/>
-                <a:hlinkClick r:id="rId3" tooltip="Standardized Operational Log of Events"/>
-              </a:rPr>
-              <a:t>Standardized Operational Log of Events</a:t>
+                <a:hlinkClick r:id="rId3" tooltip="Birth and Fetal Death Reporting Enhanced Profile"/>
+              </a:rPr>
+              <a:t>Birth and Fetal Death Reporting Enhanced Profile</a:t>
             </a:r>
             <a:r>
               <a:rPr lang="en-US" sz="1200" b="0" i="0" kern="1200" dirty="0">
@@ -3290,7 +2882,281 @@
                 <a:ea typeface="+mn-ea"/>
                 <a:cs typeface="Arial" charset="0"/>
               </a:rPr>
-              <a:t> stores and retrieves logs of operational events (patient arrives, scan complete, etc.). </a:t>
+              <a:t> captures and communicates information for birth and fetal death reporting for vital registration purposes. </a:t>
+            </a:r>
+          </a:p>
+          <a:p>
+            <a:endParaRPr lang="en-US" sz="1200" b="0" i="0" kern="1200" dirty="0">
+              <a:solidFill>
+                <a:schemeClr val="tx1"/>
+              </a:solidFill>
+              <a:effectLst/>
+              <a:latin typeface="Arial" charset="0"/>
+              <a:ea typeface="+mn-ea"/>
+              <a:cs typeface="Arial" charset="0"/>
+            </a:endParaRPr>
+          </a:p>
+          <a:p>
+            <a:r>
+              <a:rPr lang="en-US" sz="1200" b="0" i="0" kern="1200" dirty="0">
+                <a:solidFill>
+                  <a:schemeClr val="tx1"/>
+                </a:solidFill>
+                <a:effectLst/>
+                <a:latin typeface="Arial" charset="0"/>
+                <a:ea typeface="+mn-ea"/>
+                <a:cs typeface="Arial" charset="0"/>
+              </a:rPr>
+              <a:t> [CCG] </a:t>
+            </a:r>
+            <a:r>
+              <a:rPr lang="en-US" sz="1200" b="0" i="0" u="none" strike="noStrike" kern="1200" dirty="0">
+                <a:solidFill>
+                  <a:schemeClr val="tx1"/>
+                </a:solidFill>
+                <a:effectLst/>
+                <a:latin typeface="Arial" charset="0"/>
+                <a:ea typeface="+mn-ea"/>
+                <a:cs typeface="Arial" charset="0"/>
+                <a:hlinkClick r:id="rId4" tooltip="Computable Care Guidelines"/>
+              </a:rPr>
+              <a:t>Computable Care Guidelines</a:t>
+            </a:r>
+            <a:r>
+              <a:rPr lang="en-US" sz="1200" b="0" i="0" kern="1200" dirty="0">
+                <a:solidFill>
+                  <a:schemeClr val="tx1"/>
+                </a:solidFill>
+                <a:effectLst/>
+                <a:latin typeface="Arial" charset="0"/>
+                <a:ea typeface="+mn-ea"/>
+                <a:cs typeface="Arial" charset="0"/>
+              </a:rPr>
+              <a:t> encodes care guidelines in a format that can be understood by health software </a:t>
+            </a:r>
+          </a:p>
+          <a:p>
+            <a:endParaRPr lang="en-US" sz="1200" b="0" i="0" kern="1200" dirty="0">
+              <a:solidFill>
+                <a:schemeClr val="tx1"/>
+              </a:solidFill>
+              <a:effectLst/>
+              <a:latin typeface="Arial" charset="0"/>
+              <a:ea typeface="+mn-ea"/>
+              <a:cs typeface="Arial" charset="0"/>
+            </a:endParaRPr>
+          </a:p>
+          <a:p>
+            <a:r>
+              <a:rPr lang="en-US" sz="1200" b="0" i="0" kern="1200" dirty="0">
+                <a:solidFill>
+                  <a:schemeClr val="tx1"/>
+                </a:solidFill>
+                <a:effectLst/>
+                <a:latin typeface="Arial" charset="0"/>
+                <a:ea typeface="+mn-ea"/>
+                <a:cs typeface="Arial" charset="0"/>
+              </a:rPr>
+              <a:t> [</a:t>
+            </a:r>
+            <a:r>
+              <a:rPr lang="en-US" sz="1200" b="0" i="0" kern="1200" dirty="0" err="1">
+                <a:solidFill>
+                  <a:schemeClr val="tx1"/>
+                </a:solidFill>
+                <a:effectLst/>
+                <a:latin typeface="Arial" charset="0"/>
+                <a:ea typeface="+mn-ea"/>
+                <a:cs typeface="Arial" charset="0"/>
+              </a:rPr>
+              <a:t>mADX</a:t>
+            </a:r>
+            <a:r>
+              <a:rPr lang="en-US" sz="1200" b="0" i="0" kern="1200" dirty="0">
+                <a:solidFill>
+                  <a:schemeClr val="tx1"/>
+                </a:solidFill>
+                <a:effectLst/>
+                <a:latin typeface="Arial" charset="0"/>
+                <a:ea typeface="+mn-ea"/>
+                <a:cs typeface="Arial" charset="0"/>
+              </a:rPr>
+              <a:t>] </a:t>
+            </a:r>
+            <a:r>
+              <a:rPr lang="en-US" sz="1200" b="0" i="0" u="none" strike="noStrike" kern="1200" dirty="0">
+                <a:solidFill>
+                  <a:schemeClr val="tx1"/>
+                </a:solidFill>
+                <a:effectLst/>
+                <a:latin typeface="Arial" charset="0"/>
+                <a:ea typeface="+mn-ea"/>
+                <a:cs typeface="Arial" charset="0"/>
+                <a:hlinkClick r:id="rId5" tooltip="Mobile Aggregate Data Exchange (mADX)"/>
+              </a:rPr>
+              <a:t>Mobile Aggregate Data Exchange (</a:t>
+            </a:r>
+            <a:r>
+              <a:rPr lang="en-US" sz="1200" b="0" i="0" u="none" strike="noStrike" kern="1200" dirty="0" err="1">
+                <a:solidFill>
+                  <a:schemeClr val="tx1"/>
+                </a:solidFill>
+                <a:effectLst/>
+                <a:latin typeface="Arial" charset="0"/>
+                <a:ea typeface="+mn-ea"/>
+                <a:cs typeface="Arial" charset="0"/>
+                <a:hlinkClick r:id="rId5" tooltip="Mobile Aggregate Data Exchange (mADX)"/>
+              </a:rPr>
+              <a:t>mADX</a:t>
+            </a:r>
+            <a:r>
+              <a:rPr lang="en-US" sz="1200" b="0" i="0" u="none" strike="noStrike" kern="1200" dirty="0">
+                <a:solidFill>
+                  <a:schemeClr val="tx1"/>
+                </a:solidFill>
+                <a:effectLst/>
+                <a:latin typeface="Arial" charset="0"/>
+                <a:ea typeface="+mn-ea"/>
+                <a:cs typeface="Arial" charset="0"/>
+                <a:hlinkClick r:id="rId5" tooltip="Mobile Aggregate Data Exchange (mADX)"/>
+              </a:rPr>
+              <a:t>)</a:t>
+            </a:r>
+            <a:r>
+              <a:rPr lang="en-US" sz="1200" b="0" i="0" kern="1200" dirty="0">
+                <a:solidFill>
+                  <a:schemeClr val="tx1"/>
+                </a:solidFill>
+                <a:effectLst/>
+                <a:latin typeface="Arial" charset="0"/>
+                <a:ea typeface="+mn-ea"/>
+                <a:cs typeface="Arial" charset="0"/>
+              </a:rPr>
+              <a:t> supports interoperable public health reporting of aggregate health data. </a:t>
+            </a:r>
+          </a:p>
+          <a:p>
+            <a:endParaRPr lang="en-US" sz="1200" b="0" i="0" kern="1200" dirty="0">
+              <a:solidFill>
+                <a:schemeClr val="tx1"/>
+              </a:solidFill>
+              <a:effectLst/>
+              <a:latin typeface="Arial" charset="0"/>
+              <a:ea typeface="+mn-ea"/>
+              <a:cs typeface="Arial" charset="0"/>
+            </a:endParaRPr>
+          </a:p>
+          <a:p>
+            <a:r>
+              <a:rPr lang="en-US" sz="1200" b="0" i="0" kern="1200" dirty="0">
+                <a:solidFill>
+                  <a:schemeClr val="tx1"/>
+                </a:solidFill>
+                <a:effectLst/>
+                <a:latin typeface="Arial" charset="0"/>
+                <a:ea typeface="+mn-ea"/>
+                <a:cs typeface="Arial" charset="0"/>
+              </a:rPr>
+              <a:t> [</a:t>
+            </a:r>
+            <a:r>
+              <a:rPr lang="en-US" sz="1200" b="0" i="0" kern="1200" dirty="0" err="1">
+                <a:solidFill>
+                  <a:schemeClr val="tx1"/>
+                </a:solidFill>
+                <a:effectLst/>
+                <a:latin typeface="Arial" charset="0"/>
+                <a:ea typeface="+mn-ea"/>
+                <a:cs typeface="Arial" charset="0"/>
+              </a:rPr>
+              <a:t>mRFD</a:t>
+            </a:r>
+            <a:r>
+              <a:rPr lang="en-US" sz="1200" b="0" i="0" kern="1200" dirty="0">
+                <a:solidFill>
+                  <a:schemeClr val="tx1"/>
+                </a:solidFill>
+                <a:effectLst/>
+                <a:latin typeface="Arial" charset="0"/>
+                <a:ea typeface="+mn-ea"/>
+                <a:cs typeface="Arial" charset="0"/>
+              </a:rPr>
+              <a:t>] </a:t>
+            </a:r>
+            <a:r>
+              <a:rPr lang="en-US" sz="1200" b="0" i="0" u="none" strike="noStrike" kern="1200" dirty="0">
+                <a:solidFill>
+                  <a:schemeClr val="tx1"/>
+                </a:solidFill>
+                <a:effectLst/>
+                <a:latin typeface="Arial" charset="0"/>
+                <a:ea typeface="+mn-ea"/>
+                <a:cs typeface="Arial" charset="0"/>
+                <a:hlinkClick r:id="rId6" tooltip="Mobile Retrieve Form for Data Capture"/>
+              </a:rPr>
+              <a:t>Mobile Retrieve Form for Data Capture</a:t>
+            </a:r>
+            <a:r>
+              <a:rPr lang="en-US" sz="1200" b="0" i="0" kern="1200" dirty="0">
+                <a:solidFill>
+                  <a:schemeClr val="tx1"/>
+                </a:solidFill>
+                <a:effectLst/>
+                <a:latin typeface="Arial" charset="0"/>
+                <a:ea typeface="+mn-ea"/>
+                <a:cs typeface="Arial" charset="0"/>
+              </a:rPr>
+              <a:t> describes the exchange of context data to allow a seamless form launch with supporting clinical context. </a:t>
+            </a:r>
+          </a:p>
+          <a:p>
+            <a:endParaRPr lang="en-US" sz="1200" b="0" i="0" kern="1200" dirty="0">
+              <a:solidFill>
+                <a:schemeClr val="tx1"/>
+              </a:solidFill>
+              <a:effectLst/>
+              <a:latin typeface="Arial" charset="0"/>
+              <a:ea typeface="+mn-ea"/>
+              <a:cs typeface="Arial" charset="0"/>
+            </a:endParaRPr>
+          </a:p>
+          <a:p>
+            <a:r>
+              <a:rPr lang="en-US" sz="1200" b="0" i="0" kern="1200" dirty="0">
+                <a:solidFill>
+                  <a:schemeClr val="tx1"/>
+                </a:solidFill>
+                <a:effectLst/>
+                <a:latin typeface="Arial" charset="0"/>
+                <a:ea typeface="+mn-ea"/>
+                <a:cs typeface="Arial" charset="0"/>
+              </a:rPr>
+              <a:t> [PRQ] </a:t>
+            </a:r>
+            <a:r>
+              <a:rPr lang="en-US" sz="1200" b="0" i="0" u="none" strike="noStrike" kern="1200" dirty="0">
+                <a:solidFill>
+                  <a:schemeClr val="tx1"/>
+                </a:solidFill>
+                <a:effectLst/>
+                <a:latin typeface="Arial" charset="0"/>
+                <a:ea typeface="+mn-ea"/>
+                <a:cs typeface="Arial" charset="0"/>
+                <a:hlinkClick r:id="rId7" tooltip="Prescription Repository Query"/>
+              </a:rPr>
+              <a:t>Prescription Repository Query</a:t>
+            </a:r>
+            <a:r>
+              <a:rPr lang="en-US" sz="1200" b="0" i="0" kern="1200" dirty="0">
+                <a:solidFill>
+                  <a:schemeClr val="tx1"/>
+                </a:solidFill>
+                <a:effectLst/>
+                <a:latin typeface="Arial" charset="0"/>
+                <a:ea typeface="+mn-ea"/>
+                <a:cs typeface="Arial" charset="0"/>
+              </a:rPr>
+              <a:t> (PRQ) defines a Retrieve query and HTTP GET transaction that specifies the dispensed medication history information that should be seen by primary care givers to assist in making an informed decision prior to prescribing additional medications to a patient. </a:t>
             </a:r>
           </a:p>
           <a:p>
@@ -3298,11 +3164,167 @@
               <a:rPr lang="en-US" dirty="0"/>
             </a:br>
             <a:r>
+              <a:rPr lang="en-US" sz="1200" b="0" i="0" kern="1200" dirty="0">
+                <a:solidFill>
+                  <a:schemeClr val="tx1"/>
+                </a:solidFill>
+                <a:effectLst/>
+                <a:latin typeface="Arial" charset="0"/>
+                <a:ea typeface="+mn-ea"/>
+                <a:cs typeface="Arial" charset="0"/>
+              </a:rPr>
+              <a:t> [QORE] </a:t>
+            </a:r>
+            <a:r>
+              <a:rPr lang="en-US" sz="1200" b="0" i="0" u="none" strike="noStrike" kern="1200" dirty="0">
+                <a:solidFill>
+                  <a:schemeClr val="tx1"/>
+                </a:solidFill>
+                <a:effectLst/>
+                <a:latin typeface="Arial" charset="0"/>
+                <a:ea typeface="+mn-ea"/>
+                <a:cs typeface="Arial" charset="0"/>
+                <a:hlinkClick r:id="rId8" tooltip="Quality Outcome Reporting for EMS"/>
+              </a:rPr>
+              <a:t>Quality Outcome Reporting for EMS</a:t>
+            </a:r>
+            <a:r>
+              <a:rPr lang="en-US" sz="1200" b="0" i="0" kern="1200" dirty="0">
+                <a:solidFill>
+                  <a:schemeClr val="tx1"/>
+                </a:solidFill>
+                <a:effectLst/>
+                <a:latin typeface="Arial" charset="0"/>
+                <a:ea typeface="+mn-ea"/>
+                <a:cs typeface="Arial" charset="0"/>
+              </a:rPr>
+              <a:t> describes content used for continuity of care between the emergency transport scene records and destination hospital where the emergency will be treated. </a:t>
+            </a:r>
+          </a:p>
+          <a:p>
+            <a:endParaRPr lang="en-US" sz="1200" b="0" i="0" kern="1200" dirty="0">
+              <a:solidFill>
+                <a:schemeClr val="tx1"/>
+              </a:solidFill>
+              <a:effectLst/>
+              <a:latin typeface="Arial" charset="0"/>
+              <a:ea typeface="+mn-ea"/>
+              <a:cs typeface="Arial" charset="0"/>
+            </a:endParaRPr>
+          </a:p>
+          <a:p>
+            <a:r>
+              <a:rPr lang="en-US" sz="1200" b="0" i="0" kern="1200" dirty="0">
+                <a:solidFill>
+                  <a:schemeClr val="tx1"/>
+                </a:solidFill>
+                <a:effectLst/>
+                <a:latin typeface="Arial" charset="0"/>
+                <a:ea typeface="+mn-ea"/>
+                <a:cs typeface="Arial" charset="0"/>
+              </a:rPr>
+              <a:t> [VRDR] </a:t>
+            </a:r>
+            <a:r>
+              <a:rPr lang="en-US" sz="1200" b="0" i="0" u="none" strike="noStrike" kern="1200" dirty="0">
+                <a:solidFill>
+                  <a:schemeClr val="tx1"/>
+                </a:solidFill>
+                <a:effectLst/>
+                <a:latin typeface="Arial" charset="0"/>
+                <a:ea typeface="+mn-ea"/>
+                <a:cs typeface="Arial" charset="0"/>
+                <a:hlinkClick r:id="rId9" tooltip="Vital Records Death Reporting"/>
+              </a:rPr>
+              <a:t>Vital Records Death Reporting</a:t>
+            </a:r>
+            <a:r>
+              <a:rPr lang="en-US" sz="1200" b="0" i="0" kern="1200" dirty="0">
+                <a:solidFill>
+                  <a:schemeClr val="tx1"/>
+                </a:solidFill>
+                <a:effectLst/>
+                <a:latin typeface="Arial" charset="0"/>
+                <a:ea typeface="+mn-ea"/>
+                <a:cs typeface="Arial" charset="0"/>
+              </a:rPr>
+              <a:t> defines a Retrieve Form for Data Capture (RFD) content profile that will specify derivation of source content from a medical summary document. by defining requirements for form filler content and form manager handling of the content. </a:t>
+            </a:r>
+          </a:p>
+          <a:p>
+            <a:br>
               <a:rPr lang="en-US" dirty="0"/>
-              <a:t>Special mention for the RESTful standards from DICOM. These are not FHIR, but are using the same technology. These are used as an interface from FHIR to DICOM</a:t>
-            </a:r>
-          </a:p>
-          <a:p>
+            </a:br>
+            <a:endParaRPr lang="en-US" sz="1200" b="0" i="0" kern="1200" dirty="0">
+              <a:solidFill>
+                <a:schemeClr val="tx1"/>
+              </a:solidFill>
+              <a:effectLst/>
+              <a:latin typeface="Arial" charset="0"/>
+              <a:ea typeface="+mn-ea"/>
+              <a:cs typeface="Arial" charset="0"/>
+            </a:endParaRPr>
+          </a:p>
+          <a:p>
+            <a:br>
+              <a:rPr lang="en-US" dirty="0"/>
+            </a:br>
+            <a:endParaRPr lang="en-US" sz="1200" b="0" i="0" kern="1200" dirty="0">
+              <a:solidFill>
+                <a:schemeClr val="tx1"/>
+              </a:solidFill>
+              <a:effectLst/>
+              <a:latin typeface="Arial" charset="0"/>
+              <a:ea typeface="+mn-ea"/>
+              <a:cs typeface="Arial" charset="0"/>
+            </a:endParaRPr>
+          </a:p>
+          <a:p>
+            <a:br>
+              <a:rPr lang="en-US" dirty="0"/>
+            </a:br>
+            <a:endParaRPr lang="en-US" sz="1200" b="0" i="0" kern="1200" dirty="0">
+              <a:solidFill>
+                <a:schemeClr val="tx1"/>
+              </a:solidFill>
+              <a:effectLst/>
+              <a:latin typeface="Arial" charset="0"/>
+              <a:ea typeface="+mn-ea"/>
+              <a:cs typeface="Arial" charset="0"/>
+            </a:endParaRPr>
+          </a:p>
+          <a:p>
+            <a:br>
+              <a:rPr lang="en-US" dirty="0"/>
+            </a:br>
+            <a:endParaRPr lang="en-US" sz="1200" b="0" i="0" kern="1200" dirty="0">
+              <a:solidFill>
+                <a:schemeClr val="tx1"/>
+              </a:solidFill>
+              <a:effectLst/>
+              <a:latin typeface="Arial" charset="0"/>
+              <a:ea typeface="+mn-ea"/>
+              <a:cs typeface="Arial" charset="0"/>
+            </a:endParaRPr>
+          </a:p>
+          <a:p>
+            <a:br>
+              <a:rPr lang="en-US" dirty="0"/>
+            </a:br>
+            <a:endParaRPr lang="en-US" sz="1200" b="0" i="0" kern="1200" dirty="0">
+              <a:solidFill>
+                <a:schemeClr val="tx1"/>
+              </a:solidFill>
+              <a:effectLst/>
+              <a:latin typeface="Arial" charset="0"/>
+              <a:ea typeface="+mn-ea"/>
+              <a:cs typeface="Arial" charset="0"/>
+            </a:endParaRPr>
+          </a:p>
+          <a:p>
+            <a:br>
+              <a:rPr lang="en-US" dirty="0"/>
+            </a:br>
             <a:endParaRPr lang="en-US" dirty="0"/>
           </a:p>
         </p:txBody>
@@ -3330,7 +3352,7 @@
               <a:pPr>
                 <a:defRPr/>
               </a:pPr>
-              <a:t>13</a:t>
+              <a:t>14</a:t>
             </a:fld>
             <a:endParaRPr lang="en-US"/>
           </a:p>
@@ -3339,7 +3361,7 @@
     </p:spTree>
     <p:extLst>
       <p:ext uri="{BB962C8B-B14F-4D97-AF65-F5344CB8AC3E}">
-        <p14:creationId xmlns:p14="http://schemas.microsoft.com/office/powerpoint/2010/main" val="3455574832"/>
+        <p14:creationId xmlns:p14="http://schemas.microsoft.com/office/powerpoint/2010/main" val="1909852158"/>
       </p:ext>
     </p:extLst>
   </p:cSld>
@@ -3368,6 +3390,176 @@
       </p:grpSpPr>
       <p:sp>
         <p:nvSpPr>
+          <p:cNvPr id="2" name="Slide Image Placeholder 1"/>
+          <p:cNvSpPr>
+            <a:spLocks noGrp="1" noRot="1" noChangeAspect="1"/>
+          </p:cNvSpPr>
+          <p:nvPr>
+            <p:ph type="sldImg"/>
+          </p:nvPr>
+        </p:nvSpPr>
+        <p:spPr/>
+      </p:sp>
+      <p:sp>
+        <p:nvSpPr>
+          <p:cNvPr id="3" name="Notes Placeholder 2"/>
+          <p:cNvSpPr>
+            <a:spLocks noGrp="1"/>
+          </p:cNvSpPr>
+          <p:nvPr>
+            <p:ph type="body" idx="1"/>
+          </p:nvPr>
+        </p:nvSpPr>
+        <p:spPr/>
+        <p:txBody>
+          <a:bodyPr/>
+          <a:lstStyle/>
+          <a:p>
+            <a:r>
+              <a:rPr lang="en-US" sz="1200" b="0" i="0" kern="1200" dirty="0">
+                <a:solidFill>
+                  <a:schemeClr val="tx1"/>
+                </a:solidFill>
+                <a:effectLst/>
+                <a:latin typeface="Arial" charset="0"/>
+                <a:ea typeface="+mn-ea"/>
+                <a:cs typeface="Arial" charset="0"/>
+              </a:rPr>
+              <a:t> [SOLE] </a:t>
+            </a:r>
+            <a:r>
+              <a:rPr lang="en-US" sz="1200" b="0" i="0" u="none" strike="noStrike" kern="1200" dirty="0">
+                <a:solidFill>
+                  <a:schemeClr val="tx1"/>
+                </a:solidFill>
+                <a:effectLst/>
+                <a:latin typeface="Arial" charset="0"/>
+                <a:ea typeface="+mn-ea"/>
+                <a:cs typeface="Arial" charset="0"/>
+                <a:hlinkClick r:id="rId3" tooltip="Standardized Operational Log of Events"/>
+              </a:rPr>
+              <a:t>Standardized Operational Log of Events</a:t>
+            </a:r>
+            <a:r>
+              <a:rPr lang="en-US" sz="1200" b="0" i="0" kern="1200" dirty="0">
+                <a:solidFill>
+                  <a:schemeClr val="tx1"/>
+                </a:solidFill>
+                <a:effectLst/>
+                <a:latin typeface="Arial" charset="0"/>
+                <a:ea typeface="+mn-ea"/>
+                <a:cs typeface="Arial" charset="0"/>
+              </a:rPr>
+              <a:t> stores and retrieves logs of operational events (patient arrives, scan complete, etc.). </a:t>
+            </a:r>
+          </a:p>
+          <a:p>
+            <a:endParaRPr lang="en-US" sz="1200" b="0" i="0" kern="1200" dirty="0">
+              <a:solidFill>
+                <a:schemeClr val="tx1"/>
+              </a:solidFill>
+              <a:effectLst/>
+              <a:latin typeface="Arial" charset="0"/>
+              <a:ea typeface="+mn-ea"/>
+              <a:cs typeface="Arial" charset="0"/>
+            </a:endParaRPr>
+          </a:p>
+          <a:p>
+            <a:r>
+              <a:rPr lang="en-US" b="0" i="0" dirty="0">
+                <a:solidFill>
+                  <a:srgbClr val="333333"/>
+                </a:solidFill>
+                <a:effectLst/>
+                <a:latin typeface="verdana" panose="020B0604030504040204" pitchFamily="34" charset="0"/>
+              </a:rPr>
+              <a:t>The Interactive Multimedia Report (IMR) Profile specifies how a diagnostic report with interactive multimedia content can be reliably encoded, communicated and presented.</a:t>
+            </a:r>
+            <a:endParaRPr lang="en-US" sz="1200" b="0" i="0" kern="1200" dirty="0">
+              <a:solidFill>
+                <a:schemeClr val="tx1"/>
+              </a:solidFill>
+              <a:effectLst/>
+              <a:latin typeface="Arial" charset="0"/>
+              <a:ea typeface="+mn-ea"/>
+              <a:cs typeface="Arial" charset="0"/>
+            </a:endParaRPr>
+          </a:p>
+          <a:p>
+            <a:br>
+              <a:rPr lang="en-US" dirty="0"/>
+            </a:br>
+            <a:r>
+              <a:rPr lang="en-US" dirty="0"/>
+              <a:t>Special mention for the RESTful standards from DICOM. These are not FHIR, but are using the same technology. These are used as an interface from FHIR to DICOM</a:t>
+            </a:r>
+          </a:p>
+          <a:p>
+            <a:endParaRPr lang="en-US" dirty="0"/>
+          </a:p>
+        </p:txBody>
+      </p:sp>
+      <p:sp>
+        <p:nvSpPr>
+          <p:cNvPr id="4" name="Slide Number Placeholder 3"/>
+          <p:cNvSpPr>
+            <a:spLocks noGrp="1"/>
+          </p:cNvSpPr>
+          <p:nvPr>
+            <p:ph type="sldNum" sz="quarter" idx="5"/>
+          </p:nvPr>
+        </p:nvSpPr>
+        <p:spPr/>
+        <p:txBody>
+          <a:bodyPr/>
+          <a:lstStyle/>
+          <a:p>
+            <a:pPr>
+              <a:defRPr/>
+            </a:pPr>
+            <a:fld id="{6382D7ED-FE3C-4D0E-A496-3B0056AAD3E6}" type="slidenum">
+              <a:rPr lang="en-US" smtClean="0"/>
+              <a:pPr>
+                <a:defRPr/>
+              </a:pPr>
+              <a:t>15</a:t>
+            </a:fld>
+            <a:endParaRPr lang="en-US"/>
+          </a:p>
+        </p:txBody>
+      </p:sp>
+    </p:spTree>
+    <p:extLst>
+      <p:ext uri="{BB962C8B-B14F-4D97-AF65-F5344CB8AC3E}">
+        <p14:creationId xmlns:p14="http://schemas.microsoft.com/office/powerpoint/2010/main" val="3455574832"/>
+      </p:ext>
+    </p:extLst>
+  </p:cSld>
+  <p:clrMapOvr>
+    <a:masterClrMapping/>
+  </p:clrMapOvr>
+</p:notes>
+</file>
+
+<file path=ppt/notesSlides/notesSlide8.xml><?xml version="1.0" encoding="utf-8"?>
+<p:notes xmlns:a="http://schemas.openxmlformats.org/drawingml/2006/main" xmlns:r="http://schemas.openxmlformats.org/officeDocument/2006/relationships" xmlns:p="http://schemas.openxmlformats.org/presentationml/2006/main">
+  <p:cSld>
+    <p:spTree>
+      <p:nvGrpSpPr>
+        <p:cNvPr id="1" name=""/>
+        <p:cNvGrpSpPr/>
+        <p:nvPr/>
+      </p:nvGrpSpPr>
+      <p:grpSpPr>
+        <a:xfrm>
+          <a:off x="0" y="0"/>
+          <a:ext cx="0" cy="0"/>
+          <a:chOff x="0" y="0"/>
+          <a:chExt cx="0" cy="0"/>
+        </a:xfrm>
+      </p:grpSpPr>
+      <p:sp>
+        <p:nvSpPr>
           <p:cNvPr id="132098" name="Rectangle 7"/>
           <p:cNvSpPr>
             <a:spLocks noGrp="1" noChangeArrowheads="1"/>
@@ -3387,7 +3579,7 @@
             <a:fld id="{1D27111E-FC2B-4A84-BB26-67BA3BE2E651}" type="slidenum">
               <a:rPr lang="en-US" smtClean="0"/>
               <a:pPr defTabSz="910041"/>
-              <a:t>16</a:t>
+              <a:t>18</a:t>
             </a:fld>
             <a:endParaRPr lang="en-US" dirty="0"/>
           </a:p>
@@ -9482,13 +9674,7 @@
       </p:grpSpPr>
       <p:sp>
         <p:nvSpPr>
-          <p:cNvPr id="2" name="Title 1">
-            <a:extLst>
-              <a:ext uri="{FF2B5EF4-FFF2-40B4-BE49-F238E27FC236}">
-                <a16:creationId xmlns:a16="http://schemas.microsoft.com/office/drawing/2014/main" id="{785FB27F-15CF-47B6-A2C2-B40AC25DC71F}"/>
-              </a:ext>
-            </a:extLst>
-          </p:cNvPr>
+          <p:cNvPr id="5" name="Title 4"/>
           <p:cNvSpPr>
             <a:spLocks noGrp="1"/>
           </p:cNvSpPr>
@@ -9505,20 +9691,14 @@
           <a:p>
             <a:r>
               <a:rPr lang="en-US" sz="4400" dirty="0"/>
-              <a:t>Patient Care Devices</a:t>
-            </a:r>
-          </a:p>
-        </p:txBody>
-      </p:sp>
-      <p:sp>
-        <p:nvSpPr>
-          <p:cNvPr id="3" name="Content Placeholder 2">
-            <a:extLst>
-              <a:ext uri="{FF2B5EF4-FFF2-40B4-BE49-F238E27FC236}">
-                <a16:creationId xmlns:a16="http://schemas.microsoft.com/office/drawing/2014/main" id="{75FB7066-C83E-43A4-BDE2-37E8896AECDB}"/>
-              </a:ext>
-            </a:extLst>
-          </p:cNvPr>
+              <a:t>Patient Care Coordination </a:t>
+            </a:r>
+          </a:p>
+        </p:txBody>
+      </p:sp>
+      <p:sp>
+        <p:nvSpPr>
+          <p:cNvPr id="2" name="Content Placeholder 1"/>
           <p:cNvSpPr>
             <a:spLocks noGrp="1"/>
           </p:cNvSpPr>
@@ -9528,55 +9708,107 @@
         </p:nvSpPr>
         <p:spPr/>
         <p:txBody>
-          <a:bodyPr/>
+          <a:bodyPr>
+            <a:normAutofit fontScale="92500" lnSpcReduction="10000"/>
+          </a:bodyPr>
           <a:lstStyle/>
           <a:p>
             <a:r>
-              <a:rPr lang="en-US" i="1" dirty="0"/>
-              <a:t>Personal Health Device Observation Upload (PHD)</a:t>
-            </a:r>
-          </a:p>
-        </p:txBody>
-      </p:sp>
-      <p:sp>
-        <p:nvSpPr>
-          <p:cNvPr id="4" name="Slide Number Placeholder 3">
-            <a:extLst>
-              <a:ext uri="{FF2B5EF4-FFF2-40B4-BE49-F238E27FC236}">
-                <a16:creationId xmlns:a16="http://schemas.microsoft.com/office/drawing/2014/main" id="{75ECCAEC-4DA4-464E-8A20-D372010C96D3}"/>
-              </a:ext>
-            </a:extLst>
-          </p:cNvPr>
-          <p:cNvSpPr>
-            <a:spLocks noGrp="1"/>
-          </p:cNvSpPr>
-          <p:nvPr>
-            <p:ph type="sldNum" sz="quarter" idx="12"/>
-          </p:nvPr>
-        </p:nvSpPr>
-        <p:spPr/>
-        <p:txBody>
-          <a:bodyPr/>
-          <a:lstStyle/>
-          <a:p>
-            <a:pPr>
-              <a:defRPr/>
-            </a:pPr>
-            <a:fld id="{336892F5-F7A2-420A-8BF3-D2A2054912B1}" type="slidenum">
-              <a:rPr lang="en-US" smtClean="0"/>
-              <a:pPr>
-                <a:defRPr/>
-              </a:pPr>
-              <a:t>10</a:t>
-            </a:fld>
-            <a:endParaRPr lang="en-US"/>
+              <a:rPr lang="en-US" sz="2800" i="1" dirty="0"/>
+              <a:t>Assessment Curation and Data Collection (ACDC)</a:t>
+            </a:r>
+          </a:p>
+          <a:p>
+            <a:r>
+              <a:rPr lang="en-US" sz="2800" strike="sngStrike" dirty="0"/>
+              <a:t>Clinical Mapping (CMAP) </a:t>
+            </a:r>
+            <a:r>
+              <a:rPr lang="en-US" sz="2800" dirty="0">
+                <a:sym typeface="Wingdings" panose="05000000000000000000" pitchFamily="2" charset="2"/>
+              </a:rPr>
+              <a:t> See ITI SVCM</a:t>
+            </a:r>
+            <a:endParaRPr lang="en-US" sz="2800" dirty="0"/>
+          </a:p>
+          <a:p>
+            <a:r>
+              <a:rPr lang="en-US" sz="2800" dirty="0"/>
+              <a:t>Dynamic Care Planning (DCP)</a:t>
+            </a:r>
+          </a:p>
+          <a:p>
+            <a:r>
+              <a:rPr lang="en-US" sz="2800" i="1" dirty="0"/>
+              <a:t>Dynamic Care Team Management (DCTM)</a:t>
+            </a:r>
+          </a:p>
+          <a:p>
+            <a:r>
+              <a:rPr lang="en-US" sz="2800" dirty="0"/>
+              <a:t>Guideline Appropriate Ordering (GAO)</a:t>
+            </a:r>
+          </a:p>
+          <a:p>
+            <a:r>
+              <a:rPr lang="en-US" sz="2800" dirty="0"/>
+              <a:t>International Patient Summary (IPS)</a:t>
+            </a:r>
+          </a:p>
+          <a:p>
+            <a:r>
+              <a:rPr lang="en-US" sz="2800" dirty="0"/>
+              <a:t>Paramedicine Care Summary (PCS)</a:t>
+            </a:r>
+          </a:p>
+          <a:p>
+            <a:r>
+              <a:rPr lang="en-US" sz="2800" dirty="0"/>
+              <a:t>Point of Care Medical Device Tracking (PMDT) </a:t>
+            </a:r>
+          </a:p>
+          <a:p>
+            <a:r>
+              <a:rPr lang="en-US" sz="2800" dirty="0"/>
+              <a:t>Query for Existing Data for Mobile (QEDm) </a:t>
+            </a:r>
+          </a:p>
+          <a:p>
+            <a:r>
+              <a:rPr lang="en-US" sz="2800" dirty="0"/>
+              <a:t>Reconciliation of Clinical Content and Care Providers (RECON) </a:t>
+            </a:r>
+          </a:p>
+          <a:p>
+            <a:r>
+              <a:rPr lang="en-US" sz="2800" dirty="0"/>
+              <a:t>Routine Interfacility Patient Transport (RIPT)</a:t>
+            </a:r>
+          </a:p>
+          <a:p>
+            <a:endParaRPr lang="en-US" sz="2800" dirty="0"/>
+          </a:p>
+          <a:p>
+            <a:endParaRPr lang="en-US" sz="2800" dirty="0"/>
+          </a:p>
+          <a:p>
+            <a:endParaRPr lang="en-US" sz="2800" dirty="0"/>
+          </a:p>
+          <a:p>
+            <a:endParaRPr lang="en-US" sz="2800" dirty="0"/>
+          </a:p>
+          <a:p>
+            <a:endParaRPr lang="en-US" sz="2800" dirty="0"/>
+          </a:p>
+          <a:p>
+            <a:endParaRPr lang="en-US" sz="2800" dirty="0"/>
           </a:p>
         </p:txBody>
       </p:sp>
     </p:spTree>
     <p:extLst>
       <p:ext uri="{BB962C8B-B14F-4D97-AF65-F5344CB8AC3E}">
-        <p14:creationId xmlns:p14="http://schemas.microsoft.com/office/powerpoint/2010/main" val="347388912"/>
+        <p14:creationId xmlns:p14="http://schemas.microsoft.com/office/powerpoint/2010/main" val="3830578867"/>
       </p:ext>
     </p:extLst>
   </p:cSld>
@@ -9605,7 +9837,13 @@
       </p:grpSpPr>
       <p:sp>
         <p:nvSpPr>
-          <p:cNvPr id="5" name="Title 4"/>
+          <p:cNvPr id="2" name="Title 1">
+            <a:extLst>
+              <a:ext uri="{FF2B5EF4-FFF2-40B4-BE49-F238E27FC236}">
+                <a16:creationId xmlns:a16="http://schemas.microsoft.com/office/drawing/2014/main" id="{785FB27F-15CF-47B6-A2C2-B40AC25DC71F}"/>
+              </a:ext>
+            </a:extLst>
+          </p:cNvPr>
           <p:cNvSpPr>
             <a:spLocks noGrp="1"/>
           </p:cNvSpPr>
@@ -9622,14 +9860,20 @@
           <a:p>
             <a:r>
               <a:rPr lang="en-US" sz="4400" dirty="0"/>
-              <a:t>Pharmacy Profiles on FHIR</a:t>
-            </a:r>
-          </a:p>
-        </p:txBody>
-      </p:sp>
-      <p:sp>
-        <p:nvSpPr>
-          <p:cNvPr id="2" name="Content Placeholder 1"/>
+              <a:t>Devices</a:t>
+            </a:r>
+          </a:p>
+        </p:txBody>
+      </p:sp>
+      <p:sp>
+        <p:nvSpPr>
+          <p:cNvPr id="3" name="Content Placeholder 2">
+            <a:extLst>
+              <a:ext uri="{FF2B5EF4-FFF2-40B4-BE49-F238E27FC236}">
+                <a16:creationId xmlns:a16="http://schemas.microsoft.com/office/drawing/2014/main" id="{75FB7066-C83E-43A4-BDE2-37E8896AECDB}"/>
+              </a:ext>
+            </a:extLst>
+          </p:cNvPr>
           <p:cNvSpPr>
             <a:spLocks noGrp="1"/>
           </p:cNvSpPr>
@@ -9639,31 +9883,55 @@
         </p:nvSpPr>
         <p:spPr/>
         <p:txBody>
-          <a:bodyPr>
-            <a:normAutofit/>
-          </a:bodyPr>
+          <a:bodyPr/>
           <a:lstStyle/>
           <a:p>
             <a:r>
-              <a:rPr lang="en-US" sz="2800" dirty="0"/>
-              <a:t>Mobile Medication Administration (MMA)</a:t>
-            </a:r>
-          </a:p>
-          <a:p>
-            <a:r>
-              <a:rPr lang="en-US" sz="2800" dirty="0"/>
-              <a:t>Uniform Barcode Processing (UBP)</a:t>
-            </a:r>
-          </a:p>
-          <a:p>
-            <a:endParaRPr lang="en-US" sz="2800" dirty="0"/>
+              <a:rPr lang="en-US" i="1" dirty="0"/>
+              <a:t>Personal Health Device Observation Upload (POU)</a:t>
+            </a:r>
+          </a:p>
+        </p:txBody>
+      </p:sp>
+      <p:sp>
+        <p:nvSpPr>
+          <p:cNvPr id="4" name="Slide Number Placeholder 3">
+            <a:extLst>
+              <a:ext uri="{FF2B5EF4-FFF2-40B4-BE49-F238E27FC236}">
+                <a16:creationId xmlns:a16="http://schemas.microsoft.com/office/drawing/2014/main" id="{75ECCAEC-4DA4-464E-8A20-D372010C96D3}"/>
+              </a:ext>
+            </a:extLst>
+          </p:cNvPr>
+          <p:cNvSpPr>
+            <a:spLocks noGrp="1"/>
+          </p:cNvSpPr>
+          <p:nvPr>
+            <p:ph type="sldNum" sz="quarter" idx="12"/>
+          </p:nvPr>
+        </p:nvSpPr>
+        <p:spPr/>
+        <p:txBody>
+          <a:bodyPr/>
+          <a:lstStyle/>
+          <a:p>
+            <a:pPr>
+              <a:defRPr/>
+            </a:pPr>
+            <a:fld id="{336892F5-F7A2-420A-8BF3-D2A2054912B1}" type="slidenum">
+              <a:rPr lang="en-US" smtClean="0"/>
+              <a:pPr>
+                <a:defRPr/>
+              </a:pPr>
+              <a:t>11</a:t>
+            </a:fld>
+            <a:endParaRPr lang="en-US"/>
           </a:p>
         </p:txBody>
       </p:sp>
     </p:spTree>
     <p:extLst>
       <p:ext uri="{BB962C8B-B14F-4D97-AF65-F5344CB8AC3E}">
-        <p14:creationId xmlns:p14="http://schemas.microsoft.com/office/powerpoint/2010/main" val="3985053377"/>
+        <p14:creationId xmlns:p14="http://schemas.microsoft.com/office/powerpoint/2010/main" val="347388912"/>
       </p:ext>
     </p:extLst>
   </p:cSld>
@@ -9692,7 +9960,13 @@
       </p:grpSpPr>
       <p:sp>
         <p:nvSpPr>
-          <p:cNvPr id="5" name="Title 4"/>
+          <p:cNvPr id="2" name="Title 1">
+            <a:extLst>
+              <a:ext uri="{FF2B5EF4-FFF2-40B4-BE49-F238E27FC236}">
+                <a16:creationId xmlns:a16="http://schemas.microsoft.com/office/drawing/2014/main" id="{118192E2-2EE2-40D1-98CE-C01A12F5D3C7}"/>
+              </a:ext>
+            </a:extLst>
+          </p:cNvPr>
           <p:cNvSpPr>
             <a:spLocks noGrp="1"/>
           </p:cNvSpPr>
@@ -9702,21 +9976,25 @@
         </p:nvSpPr>
         <p:spPr/>
         <p:txBody>
-          <a:bodyPr>
-            <a:normAutofit/>
-          </a:bodyPr>
+          <a:bodyPr/>
           <a:lstStyle/>
           <a:p>
             <a:r>
-              <a:rPr lang="en-US" sz="4400" dirty="0"/>
-              <a:t>QRPH Profiles on FHIR</a:t>
-            </a:r>
-          </a:p>
-        </p:txBody>
-      </p:sp>
-      <p:sp>
-        <p:nvSpPr>
-          <p:cNvPr id="2" name="Content Placeholder 1"/>
+              <a:rPr lang="en-US" dirty="0"/>
+              <a:t>Pathology and Laboratory Medicine</a:t>
+            </a:r>
+          </a:p>
+        </p:txBody>
+      </p:sp>
+      <p:sp>
+        <p:nvSpPr>
+          <p:cNvPr id="3" name="Content Placeholder 2">
+            <a:extLst>
+              <a:ext uri="{FF2B5EF4-FFF2-40B4-BE49-F238E27FC236}">
+                <a16:creationId xmlns:a16="http://schemas.microsoft.com/office/drawing/2014/main" id="{701E8F9D-5998-45E5-BFDC-8CA3EE83DFB4}"/>
+              </a:ext>
+            </a:extLst>
+          </p:cNvPr>
           <p:cNvSpPr>
             <a:spLocks noGrp="1"/>
           </p:cNvSpPr>
@@ -9726,80 +10004,55 @@
         </p:nvSpPr>
         <p:spPr/>
         <p:txBody>
-          <a:bodyPr>
-            <a:normAutofit/>
-          </a:bodyPr>
+          <a:bodyPr/>
           <a:lstStyle/>
           <a:p>
             <a:r>
-              <a:rPr lang="en-US" sz="2800" dirty="0"/>
-              <a:t>Birth and Fetal Death Reporting – Enhanced (BFDE)</a:t>
-            </a:r>
-          </a:p>
-          <a:p>
-            <a:r>
-              <a:rPr lang="en-US" sz="2800" i="1" dirty="0"/>
-              <a:t>Computable Care Guidelines (CCG)</a:t>
-            </a:r>
-          </a:p>
-          <a:p>
-            <a:r>
-              <a:rPr lang="en-US" sz="2800" dirty="0"/>
-              <a:t>Mobile Aggregate Data Exchange (</a:t>
-            </a:r>
-            <a:r>
-              <a:rPr lang="en-US" sz="2800" dirty="0" err="1"/>
-              <a:t>mADX</a:t>
-            </a:r>
-            <a:r>
-              <a:rPr lang="en-US" sz="2800" dirty="0"/>
-              <a:t>)</a:t>
-            </a:r>
-          </a:p>
-          <a:p>
-            <a:r>
-              <a:rPr lang="en-US" sz="2800" dirty="0"/>
-              <a:t>Mobile Retrieve Form for Data Capture (</a:t>
-            </a:r>
-            <a:r>
-              <a:rPr lang="en-US" sz="2800" dirty="0" err="1"/>
-              <a:t>mRFD</a:t>
-            </a:r>
-            <a:r>
-              <a:rPr lang="en-US" sz="2800" dirty="0"/>
-              <a:t>)</a:t>
-            </a:r>
-          </a:p>
-          <a:p>
-            <a:r>
-              <a:rPr lang="en-US" sz="2800" dirty="0"/>
-              <a:t>Prescription Repository Query (PRQ)</a:t>
-            </a:r>
-          </a:p>
-          <a:p>
-            <a:r>
-              <a:rPr lang="en-US" sz="2800" dirty="0"/>
-              <a:t>Quality Outcome Reporting for EMS (QORE)</a:t>
-            </a:r>
-          </a:p>
-          <a:p>
-            <a:r>
-              <a:rPr lang="en-US" sz="2800" dirty="0"/>
-              <a:t>Vital Records Death Reporting (VRDR)</a:t>
-            </a:r>
-          </a:p>
-          <a:p>
-            <a:endParaRPr lang="en-US" sz="2800" dirty="0"/>
-          </a:p>
-          <a:p>
-            <a:endParaRPr lang="en-US" sz="2800" dirty="0"/>
+              <a:rPr lang="en-US" dirty="0"/>
+              <a:t>Radiology Pathology Concordance (RPC)</a:t>
+            </a:r>
+          </a:p>
+        </p:txBody>
+      </p:sp>
+      <p:sp>
+        <p:nvSpPr>
+          <p:cNvPr id="4" name="Slide Number Placeholder 3">
+            <a:extLst>
+              <a:ext uri="{FF2B5EF4-FFF2-40B4-BE49-F238E27FC236}">
+                <a16:creationId xmlns:a16="http://schemas.microsoft.com/office/drawing/2014/main" id="{E203D67F-508C-46E1-AFAB-6C3722A9F845}"/>
+              </a:ext>
+            </a:extLst>
+          </p:cNvPr>
+          <p:cNvSpPr>
+            <a:spLocks noGrp="1"/>
+          </p:cNvSpPr>
+          <p:nvPr>
+            <p:ph type="sldNum" sz="quarter" idx="12"/>
+          </p:nvPr>
+        </p:nvSpPr>
+        <p:spPr/>
+        <p:txBody>
+          <a:bodyPr/>
+          <a:lstStyle/>
+          <a:p>
+            <a:pPr>
+              <a:defRPr/>
+            </a:pPr>
+            <a:fld id="{336892F5-F7A2-420A-8BF3-D2A2054912B1}" type="slidenum">
+              <a:rPr lang="en-US" smtClean="0"/>
+              <a:pPr>
+                <a:defRPr/>
+              </a:pPr>
+              <a:t>12</a:t>
+            </a:fld>
+            <a:endParaRPr lang="en-US"/>
           </a:p>
         </p:txBody>
       </p:sp>
     </p:spTree>
     <p:extLst>
       <p:ext uri="{BB962C8B-B14F-4D97-AF65-F5344CB8AC3E}">
-        <p14:creationId xmlns:p14="http://schemas.microsoft.com/office/powerpoint/2010/main" val="2929893371"/>
+        <p14:creationId xmlns:p14="http://schemas.microsoft.com/office/powerpoint/2010/main" val="3129445202"/>
       </p:ext>
     </p:extLst>
   </p:cSld>
@@ -9845,14 +10098,14 @@
           <a:p>
             <a:r>
               <a:rPr lang="en-US" sz="4400" dirty="0"/>
-              <a:t>Radiology Profiles on FHIR</a:t>
-            </a:r>
-          </a:p>
-        </p:txBody>
-      </p:sp>
-      <p:sp>
-        <p:nvSpPr>
-          <p:cNvPr id="6" name="Content Placeholder 5"/>
+              <a:t>Pharmacy Profiles on FHIR</a:t>
+            </a:r>
+          </a:p>
+        </p:txBody>
+      </p:sp>
+      <p:sp>
+        <p:nvSpPr>
+          <p:cNvPr id="2" name="Content Placeholder 1"/>
           <p:cNvSpPr>
             <a:spLocks noGrp="1"/>
           </p:cNvSpPr>
@@ -9868,52 +10121,25 @@
           <a:lstStyle/>
           <a:p>
             <a:r>
-              <a:rPr lang="en-US" sz="3200" dirty="0"/>
-              <a:t>Standardized Operational Log of Events (SOLE)</a:t>
-            </a:r>
-          </a:p>
-          <a:p>
-            <a:endParaRPr lang="en-US" sz="3200" dirty="0"/>
-          </a:p>
-          <a:p>
-            <a:r>
-              <a:rPr lang="en-US" sz="3200" dirty="0"/>
-              <a:t>Special mention as these use compatible DICOM web</a:t>
-            </a:r>
-          </a:p>
-          <a:p>
-            <a:pPr lvl="1"/>
-            <a:r>
               <a:rPr lang="en-US" sz="2800" dirty="0"/>
-              <a:t>Web Image Capture (WIC)</a:t>
-            </a:r>
-          </a:p>
-          <a:p>
-            <a:pPr lvl="1"/>
+              <a:t>Mobile Medication Administration (MMA)</a:t>
+            </a:r>
+          </a:p>
+          <a:p>
             <a:r>
               <a:rPr lang="en-US" sz="2800" dirty="0"/>
-              <a:t>Web Image Access (WIA) formerly called MHD-I</a:t>
-            </a:r>
-          </a:p>
-          <a:p>
-            <a:pPr lvl="1"/>
-            <a:r>
-              <a:rPr lang="en-US" sz="2800" dirty="0"/>
-              <a:t>Invoke Image Display (IID) - Special mention</a:t>
-            </a:r>
-          </a:p>
-          <a:p>
-            <a:endParaRPr lang="en-US" sz="3200" dirty="0"/>
-          </a:p>
-          <a:p>
-            <a:endParaRPr lang="en-US" sz="3200" dirty="0"/>
+              <a:t>Uniform Barcode Processing (UBP)</a:t>
+            </a:r>
+          </a:p>
+          <a:p>
+            <a:endParaRPr lang="en-US" sz="2800" dirty="0"/>
           </a:p>
         </p:txBody>
       </p:sp>
     </p:spTree>
     <p:extLst>
       <p:ext uri="{BB962C8B-B14F-4D97-AF65-F5344CB8AC3E}">
-        <p14:creationId xmlns:p14="http://schemas.microsoft.com/office/powerpoint/2010/main" val="3480798922"/>
+        <p14:creationId xmlns:p14="http://schemas.microsoft.com/office/powerpoint/2010/main" val="3985053377"/>
       </p:ext>
     </p:extLst>
   </p:cSld>
@@ -9942,13 +10168,7 @@
       </p:grpSpPr>
       <p:sp>
         <p:nvSpPr>
-          <p:cNvPr id="2" name="Title 1">
-            <a:extLst>
-              <a:ext uri="{FF2B5EF4-FFF2-40B4-BE49-F238E27FC236}">
-                <a16:creationId xmlns:a16="http://schemas.microsoft.com/office/drawing/2014/main" id="{9D8DE4E9-15B7-4BDF-9512-84A79CD81D25}"/>
-              </a:ext>
-            </a:extLst>
-          </p:cNvPr>
+          <p:cNvPr id="5" name="Title 4"/>
           <p:cNvSpPr>
             <a:spLocks noGrp="1"/>
           </p:cNvSpPr>
@@ -9965,20 +10185,14 @@
           <a:p>
             <a:r>
               <a:rPr lang="en-US" sz="4400" dirty="0"/>
-              <a:t>Move to FHIR R4</a:t>
-            </a:r>
-          </a:p>
-        </p:txBody>
-      </p:sp>
-      <p:sp>
-        <p:nvSpPr>
-          <p:cNvPr id="3" name="Content Placeholder 2">
-            <a:extLst>
-              <a:ext uri="{FF2B5EF4-FFF2-40B4-BE49-F238E27FC236}">
-                <a16:creationId xmlns:a16="http://schemas.microsoft.com/office/drawing/2014/main" id="{F4DC93D8-0764-4ECF-9C13-CF7115671185}"/>
-              </a:ext>
-            </a:extLst>
-          </p:cNvPr>
+              <a:t>QRPH Profiles on FHIR</a:t>
+            </a:r>
+          </a:p>
+        </p:txBody>
+      </p:sp>
+      <p:sp>
+        <p:nvSpPr>
+          <p:cNvPr id="2" name="Content Placeholder 1"/>
           <p:cNvSpPr>
             <a:spLocks noGrp="1"/>
           </p:cNvSpPr>
@@ -9994,38 +10208,74 @@
           <a:lstStyle/>
           <a:p>
             <a:r>
-              <a:rPr lang="en-US" sz="2400" dirty="0"/>
-              <a:t>All profiles are expected to be revised to use FHIR R4</a:t>
-            </a:r>
-          </a:p>
-          <a:p>
-            <a:r>
-              <a:rPr lang="en-US" sz="2400" dirty="0"/>
-              <a:t>All profiles will continue to be revised until the resources they use are Normative.</a:t>
-            </a:r>
-          </a:p>
-          <a:p>
-            <a:pPr lvl="1"/>
-            <a:r>
-              <a:rPr lang="en-US" sz="2070" dirty="0"/>
-              <a:t>Candidate for Final Text: PDQm, PIXm, and Appendix Z</a:t>
-            </a:r>
-          </a:p>
-          <a:p>
-            <a:r>
-              <a:rPr lang="en-US" sz="2400" dirty="0"/>
-              <a:t>IHE Governance prevents normative until underlying standard is normative</a:t>
-            </a:r>
-          </a:p>
-          <a:p>
-            <a:endParaRPr lang="en-US" sz="2400" dirty="0"/>
+              <a:rPr lang="en-US" sz="2800" dirty="0"/>
+              <a:t>Birth and Fetal Death Reporting – Enhanced (BFDE)</a:t>
+            </a:r>
+          </a:p>
+          <a:p>
+            <a:r>
+              <a:rPr lang="en-US" sz="2800" dirty="0"/>
+              <a:t>Computable Care Guidelines (CCG) – draft only</a:t>
+            </a:r>
+          </a:p>
+          <a:p>
+            <a:r>
+              <a:rPr lang="en-US" sz="2800" dirty="0"/>
+              <a:t>Mobile Aggregate Data Exchange (</a:t>
+            </a:r>
+            <a:r>
+              <a:rPr lang="en-US" sz="2800" dirty="0" err="1"/>
+              <a:t>mADX</a:t>
+            </a:r>
+            <a:r>
+              <a:rPr lang="en-US" sz="2800" dirty="0"/>
+              <a:t>)</a:t>
+            </a:r>
+          </a:p>
+          <a:p>
+            <a:r>
+              <a:rPr lang="en-US" sz="2800" dirty="0"/>
+              <a:t>Mobile Retrieve Form for Data Capture (</a:t>
+            </a:r>
+            <a:r>
+              <a:rPr lang="en-US" sz="2800" dirty="0" err="1"/>
+              <a:t>mRFD</a:t>
+            </a:r>
+            <a:r>
+              <a:rPr lang="en-US" sz="2800" dirty="0"/>
+              <a:t>)</a:t>
+            </a:r>
+          </a:p>
+          <a:p>
+            <a:r>
+              <a:rPr lang="en-US" sz="2800" dirty="0"/>
+              <a:t>Prescription Repository Query (PRQ)</a:t>
+            </a:r>
+          </a:p>
+          <a:p>
+            <a:r>
+              <a:rPr lang="en-US" sz="2800" dirty="0"/>
+              <a:t>Quality Outcome Reporting for EMS (QORE)</a:t>
+            </a:r>
+          </a:p>
+          <a:p>
+            <a:r>
+              <a:rPr lang="en-US" sz="2800" dirty="0"/>
+              <a:t>Vital Records Death Reporting (VRDR)</a:t>
+            </a:r>
+          </a:p>
+          <a:p>
+            <a:endParaRPr lang="en-US" sz="2800" dirty="0"/>
+          </a:p>
+          <a:p>
+            <a:endParaRPr lang="en-US" sz="2800" dirty="0"/>
           </a:p>
         </p:txBody>
       </p:sp>
     </p:spTree>
     <p:extLst>
       <p:ext uri="{BB962C8B-B14F-4D97-AF65-F5344CB8AC3E}">
-        <p14:creationId xmlns:p14="http://schemas.microsoft.com/office/powerpoint/2010/main" val="3568641185"/>
+        <p14:creationId xmlns:p14="http://schemas.microsoft.com/office/powerpoint/2010/main" val="2929893371"/>
       </p:ext>
     </p:extLst>
   </p:cSld>
@@ -10071,14 +10321,14 @@
           <a:p>
             <a:r>
               <a:rPr lang="en-US" sz="4400" dirty="0"/>
-              <a:t>IHE on FHIR</a:t>
-            </a:r>
-          </a:p>
-        </p:txBody>
-      </p:sp>
-      <p:sp>
-        <p:nvSpPr>
-          <p:cNvPr id="2" name="Content Placeholder 1"/>
+              <a:t>Radiology Profiles on FHIR</a:t>
+            </a:r>
+          </a:p>
+        </p:txBody>
+      </p:sp>
+      <p:sp>
+        <p:nvSpPr>
+          <p:cNvPr id="6" name="Content Placeholder 5"/>
           <p:cNvSpPr>
             <a:spLocks noGrp="1"/>
           </p:cNvSpPr>
@@ -10094,67 +10344,58 @@
           <a:lstStyle/>
           <a:p>
             <a:r>
+              <a:rPr lang="en-US" sz="3200" dirty="0"/>
+              <a:t>Standardized Operational Log of Events (SOLE)</a:t>
+            </a:r>
+          </a:p>
+          <a:p>
+            <a:r>
+              <a:rPr lang="en-US" sz="3200" dirty="0"/>
+              <a:t>Interactive Multimedia Report (IMR)</a:t>
+            </a:r>
+          </a:p>
+          <a:p>
+            <a:endParaRPr lang="en-US" sz="3200" dirty="0"/>
+          </a:p>
+          <a:p>
+            <a:r>
+              <a:rPr lang="en-US" sz="3200" dirty="0"/>
+              <a:t>Special mention as these use compatible DICOM web</a:t>
+            </a:r>
+          </a:p>
+          <a:p>
+            <a:pPr lvl="1"/>
+            <a:r>
               <a:rPr lang="en-US" sz="2800" dirty="0"/>
-              <a:t>32 Profiles and growing</a:t>
+              <a:t>Web Image Capture (WIC)</a:t>
             </a:r>
           </a:p>
           <a:p>
             <a:pPr lvl="1"/>
             <a:r>
-              <a:rPr lang="en-US" sz="2400" dirty="0"/>
-              <a:t>IT Infrastructure (ITI) - 12</a:t>
+              <a:rPr lang="en-US" sz="2800" dirty="0"/>
+              <a:t>Web Image Access (WIA) formerly called MHD-I</a:t>
             </a:r>
           </a:p>
           <a:p>
             <a:pPr lvl="1"/>
             <a:r>
-              <a:rPr lang="en-US" sz="2400" dirty="0"/>
-              <a:t>Patient Care Coordination – 9</a:t>
-            </a:r>
-          </a:p>
-          <a:p>
-            <a:pPr lvl="1"/>
-            <a:r>
-              <a:rPr lang="en-US" sz="2400" dirty="0"/>
-              <a:t>Patient Care Devices - 1</a:t>
-            </a:r>
-          </a:p>
-          <a:p>
-            <a:pPr lvl="1"/>
-            <a:r>
-              <a:rPr lang="en-US" sz="2400" dirty="0"/>
-              <a:t>Pharmacy - 2</a:t>
-            </a:r>
-          </a:p>
-          <a:p>
-            <a:pPr lvl="1"/>
-            <a:r>
-              <a:rPr lang="en-US" sz="2400" dirty="0"/>
-              <a:t>Quality, Research and Public Health - 7</a:t>
-            </a:r>
-          </a:p>
-          <a:p>
-            <a:pPr lvl="1"/>
-            <a:r>
-              <a:rPr lang="en-US" sz="2400" dirty="0"/>
-              <a:t>Radiology - 1</a:t>
-            </a:r>
-          </a:p>
-          <a:p>
-            <a:endParaRPr lang="en-US" dirty="0"/>
-          </a:p>
-          <a:p>
-            <a:endParaRPr lang="en-US" dirty="0"/>
-          </a:p>
-          <a:p>
-            <a:endParaRPr lang="en-US" dirty="0"/>
+              <a:rPr lang="en-US" sz="2800" dirty="0"/>
+              <a:t>Invoke Image Display (IID) - Special mention</a:t>
+            </a:r>
+          </a:p>
+          <a:p>
+            <a:endParaRPr lang="en-US" sz="3200" dirty="0"/>
+          </a:p>
+          <a:p>
+            <a:endParaRPr lang="en-US" sz="3200" dirty="0"/>
           </a:p>
         </p:txBody>
       </p:sp>
     </p:spTree>
     <p:extLst>
       <p:ext uri="{BB962C8B-B14F-4D97-AF65-F5344CB8AC3E}">
-        <p14:creationId xmlns:p14="http://schemas.microsoft.com/office/powerpoint/2010/main" val="4026673099"/>
+        <p14:creationId xmlns:p14="http://schemas.microsoft.com/office/powerpoint/2010/main" val="3480798922"/>
       </p:ext>
     </p:extLst>
   </p:cSld>
@@ -10183,6 +10424,262 @@
       </p:grpSpPr>
       <p:sp>
         <p:nvSpPr>
+          <p:cNvPr id="2" name="Title 1">
+            <a:extLst>
+              <a:ext uri="{FF2B5EF4-FFF2-40B4-BE49-F238E27FC236}">
+                <a16:creationId xmlns:a16="http://schemas.microsoft.com/office/drawing/2014/main" id="{9D8DE4E9-15B7-4BDF-9512-84A79CD81D25}"/>
+              </a:ext>
+            </a:extLst>
+          </p:cNvPr>
+          <p:cNvSpPr>
+            <a:spLocks noGrp="1"/>
+          </p:cNvSpPr>
+          <p:nvPr>
+            <p:ph type="title"/>
+          </p:nvPr>
+        </p:nvSpPr>
+        <p:spPr/>
+        <p:txBody>
+          <a:bodyPr>
+            <a:normAutofit/>
+          </a:bodyPr>
+          <a:lstStyle/>
+          <a:p>
+            <a:r>
+              <a:rPr lang="en-US" sz="4400" dirty="0"/>
+              <a:t>Move to FHIR R4</a:t>
+            </a:r>
+          </a:p>
+        </p:txBody>
+      </p:sp>
+      <p:sp>
+        <p:nvSpPr>
+          <p:cNvPr id="3" name="Content Placeholder 2">
+            <a:extLst>
+              <a:ext uri="{FF2B5EF4-FFF2-40B4-BE49-F238E27FC236}">
+                <a16:creationId xmlns:a16="http://schemas.microsoft.com/office/drawing/2014/main" id="{F4DC93D8-0764-4ECF-9C13-CF7115671185}"/>
+              </a:ext>
+            </a:extLst>
+          </p:cNvPr>
+          <p:cNvSpPr>
+            <a:spLocks noGrp="1"/>
+          </p:cNvSpPr>
+          <p:nvPr>
+            <p:ph idx="1"/>
+          </p:nvPr>
+        </p:nvSpPr>
+        <p:spPr/>
+        <p:txBody>
+          <a:bodyPr>
+            <a:normAutofit/>
+          </a:bodyPr>
+          <a:lstStyle/>
+          <a:p>
+            <a:r>
+              <a:rPr lang="en-US" sz="2400" dirty="0"/>
+              <a:t>All profiles are expected to be revised to use FHIR R4</a:t>
+            </a:r>
+          </a:p>
+          <a:p>
+            <a:r>
+              <a:rPr lang="en-US" sz="2400" dirty="0"/>
+              <a:t>All profiles will continue to be revised until the resources they use are Normative.</a:t>
+            </a:r>
+          </a:p>
+          <a:p>
+            <a:pPr lvl="1"/>
+            <a:r>
+              <a:rPr lang="en-US" sz="2070" dirty="0"/>
+              <a:t>Candidate for Final Text: PDQm, PIXm, and Appendix Z</a:t>
+            </a:r>
+          </a:p>
+          <a:p>
+            <a:r>
+              <a:rPr lang="en-US" sz="2400" dirty="0"/>
+              <a:t>IHE Governance prevents normative until underlying standard is normative</a:t>
+            </a:r>
+          </a:p>
+          <a:p>
+            <a:endParaRPr lang="en-US" sz="2400" dirty="0"/>
+          </a:p>
+        </p:txBody>
+      </p:sp>
+    </p:spTree>
+    <p:extLst>
+      <p:ext uri="{BB962C8B-B14F-4D97-AF65-F5344CB8AC3E}">
+        <p14:creationId xmlns:p14="http://schemas.microsoft.com/office/powerpoint/2010/main" val="3568641185"/>
+      </p:ext>
+    </p:extLst>
+  </p:cSld>
+  <p:clrMapOvr>
+    <a:masterClrMapping/>
+  </p:clrMapOvr>
+</p:sld>
+</file>
+
+<file path=ppt/slides/slide17.xml><?xml version="1.0" encoding="utf-8"?>
+<p:sld xmlns:a="http://schemas.openxmlformats.org/drawingml/2006/main" xmlns:r="http://schemas.openxmlformats.org/officeDocument/2006/relationships" xmlns:p="http://schemas.openxmlformats.org/presentationml/2006/main">
+  <p:cSld>
+    <p:spTree>
+      <p:nvGrpSpPr>
+        <p:cNvPr id="1" name=""/>
+        <p:cNvGrpSpPr/>
+        <p:nvPr/>
+      </p:nvGrpSpPr>
+      <p:grpSpPr>
+        <a:xfrm>
+          <a:off x="0" y="0"/>
+          <a:ext cx="0" cy="0"/>
+          <a:chOff x="0" y="0"/>
+          <a:chExt cx="0" cy="0"/>
+        </a:xfrm>
+      </p:grpSpPr>
+      <p:sp>
+        <p:nvSpPr>
+          <p:cNvPr id="5" name="Title 4"/>
+          <p:cNvSpPr>
+            <a:spLocks noGrp="1"/>
+          </p:cNvSpPr>
+          <p:nvPr>
+            <p:ph type="title"/>
+          </p:nvPr>
+        </p:nvSpPr>
+        <p:spPr/>
+        <p:txBody>
+          <a:bodyPr>
+            <a:normAutofit/>
+          </a:bodyPr>
+          <a:lstStyle/>
+          <a:p>
+            <a:r>
+              <a:rPr lang="en-US" sz="4400" dirty="0"/>
+              <a:t>IHE on FHIR</a:t>
+            </a:r>
+          </a:p>
+        </p:txBody>
+      </p:sp>
+      <p:sp>
+        <p:nvSpPr>
+          <p:cNvPr id="2" name="Content Placeholder 1"/>
+          <p:cNvSpPr>
+            <a:spLocks noGrp="1"/>
+          </p:cNvSpPr>
+          <p:nvPr>
+            <p:ph idx="1"/>
+          </p:nvPr>
+        </p:nvSpPr>
+        <p:spPr/>
+        <p:txBody>
+          <a:bodyPr>
+            <a:normAutofit/>
+          </a:bodyPr>
+          <a:lstStyle/>
+          <a:p>
+            <a:r>
+              <a:rPr lang="en-US" sz="2800" dirty="0"/>
+              <a:t>36 Profiles and growing</a:t>
+            </a:r>
+          </a:p>
+          <a:p>
+            <a:pPr lvl="1"/>
+            <a:r>
+              <a:rPr lang="en-US" sz="2400" dirty="0"/>
+              <a:t>Devices - 1</a:t>
+            </a:r>
+          </a:p>
+          <a:p>
+            <a:pPr lvl="1"/>
+            <a:r>
+              <a:rPr lang="en-US" sz="2400" dirty="0"/>
+              <a:t>IT Infrastructure (ITI) – 12 + 1</a:t>
+            </a:r>
+          </a:p>
+          <a:p>
+            <a:pPr lvl="1"/>
+            <a:r>
+              <a:rPr lang="en-US" sz="2400" dirty="0"/>
+              <a:t>Pathology and Lab (</a:t>
+            </a:r>
+            <a:r>
+              <a:rPr lang="en-US" sz="2400" dirty="0" err="1"/>
+              <a:t>PaLM</a:t>
+            </a:r>
+            <a:r>
+              <a:rPr lang="en-US" sz="2400" dirty="0"/>
+              <a:t>) - 1</a:t>
+            </a:r>
+          </a:p>
+          <a:p>
+            <a:pPr lvl="1"/>
+            <a:r>
+              <a:rPr lang="en-US" sz="2400" dirty="0"/>
+              <a:t>Patient Care Coordination – 10</a:t>
+            </a:r>
+          </a:p>
+          <a:p>
+            <a:pPr lvl="1"/>
+            <a:r>
+              <a:rPr lang="en-US" sz="2400" dirty="0"/>
+              <a:t>Pharmacy - 2</a:t>
+            </a:r>
+          </a:p>
+          <a:p>
+            <a:pPr lvl="1"/>
+            <a:r>
+              <a:rPr lang="en-US" sz="2400" dirty="0"/>
+              <a:t>Quality, Research and Public Health - 7</a:t>
+            </a:r>
+          </a:p>
+          <a:p>
+            <a:pPr lvl="1"/>
+            <a:r>
+              <a:rPr lang="en-US" sz="2400" dirty="0"/>
+              <a:t>Radiology - 2</a:t>
+            </a:r>
+          </a:p>
+          <a:p>
+            <a:endParaRPr lang="en-US" dirty="0"/>
+          </a:p>
+          <a:p>
+            <a:endParaRPr lang="en-US" dirty="0"/>
+          </a:p>
+          <a:p>
+            <a:endParaRPr lang="en-US" dirty="0"/>
+          </a:p>
+        </p:txBody>
+      </p:sp>
+    </p:spTree>
+    <p:extLst>
+      <p:ext uri="{BB962C8B-B14F-4D97-AF65-F5344CB8AC3E}">
+        <p14:creationId xmlns:p14="http://schemas.microsoft.com/office/powerpoint/2010/main" val="4026673099"/>
+      </p:ext>
+    </p:extLst>
+  </p:cSld>
+  <p:clrMapOvr>
+    <a:masterClrMapping/>
+  </p:clrMapOvr>
+</p:sld>
+</file>
+
+<file path=ppt/slides/slide18.xml><?xml version="1.0" encoding="utf-8"?>
+<p:sld xmlns:a="http://schemas.openxmlformats.org/drawingml/2006/main" xmlns:r="http://schemas.openxmlformats.org/officeDocument/2006/relationships" xmlns:p="http://schemas.openxmlformats.org/presentationml/2006/main">
+  <p:cSld>
+    <p:spTree>
+      <p:nvGrpSpPr>
+        <p:cNvPr id="1" name=""/>
+        <p:cNvGrpSpPr/>
+        <p:nvPr/>
+      </p:nvGrpSpPr>
+      <p:grpSpPr>
+        <a:xfrm>
+          <a:off x="0" y="0"/>
+          <a:ext cx="0" cy="0"/>
+          <a:chOff x="0" y="0"/>
+          <a:chExt cx="0" cy="0"/>
+        </a:xfrm>
+      </p:grpSpPr>
+      <p:sp>
+        <p:nvSpPr>
           <p:cNvPr id="4" name="Title 3">
             <a:extLst>
               <a:ext uri="{FF2B5EF4-FFF2-40B4-BE49-F238E27FC236}">
@@ -10313,7 +10810,7 @@
             <a:fld id="{C52921F7-34AA-45FB-8377-BFCAE17E0413}" type="slidenum">
               <a:rPr lang="en-US" smtClean="0"/>
               <a:pPr defTabSz="1018818"/>
-              <a:t>16</a:t>
+              <a:t>18</a:t>
             </a:fld>
             <a:endParaRPr lang="en-US" dirty="0"/>
           </a:p>
@@ -10412,7 +10909,7 @@
         </p:spPr>
         <p:txBody>
           <a:bodyPr>
-            <a:normAutofit fontScale="92500"/>
+            <a:normAutofit lnSpcReduction="10000"/>
           </a:bodyPr>
           <a:lstStyle/>
           <a:p>
@@ -10488,24 +10985,7 @@
             </a:pPr>
             <a:r>
               <a:rPr lang="en-US" sz="1650" dirty="0"/>
-              <a:t>HITRUST Certified CSF Practitioner</a:t>
-            </a:r>
-          </a:p>
-          <a:p>
-            <a:pPr marL="0" indent="0">
-              <a:buNone/>
-            </a:pPr>
-            <a:r>
-              <a:rPr lang="en-US" sz="1650" dirty="0"/>
-              <a:t>Employee of ByLight Professional IT Services -- Contractor to VHA </a:t>
-            </a:r>
-            <a:r>
-              <a:rPr lang="en-US" sz="1650" dirty="0" err="1"/>
-              <a:t>MyHealtheVet</a:t>
-            </a:r>
-            <a:r>
-              <a:rPr lang="en-US" sz="1650" dirty="0"/>
-              <a:t> </a:t>
+              <a:t>Employee of ByLight Professional IT Services -- Contractor to VHA MyHealtheVet </a:t>
             </a:r>
           </a:p>
           <a:p>
@@ -10980,7 +11460,11 @@
           </a:p>
           <a:p>
             <a:r>
-              <a:rPr lang="en-US" sz="4000" dirty="0"/>
+              <a:rPr lang="en-US" sz="4000" dirty="0">
+                <a:solidFill>
+                  <a:srgbClr val="FF0000"/>
+                </a:solidFill>
+              </a:rPr>
               <a:t>Pathology and Laboratory Medicine</a:t>
             </a:r>
           </a:p>
@@ -11002,7 +11486,7 @@
                   <a:srgbClr val="FF0000"/>
                 </a:solidFill>
               </a:rPr>
-              <a:t>Patient Care Device</a:t>
+              <a:t>Devices</a:t>
             </a:r>
           </a:p>
           <a:p>
@@ -11027,7 +11511,11 @@
           </a:p>
           <a:p>
             <a:r>
-              <a:rPr lang="en-US" sz="4000" dirty="0"/>
+              <a:rPr lang="en-US" sz="4000" dirty="0">
+                <a:solidFill>
+                  <a:srgbClr val="FF0000"/>
+                </a:solidFill>
+              </a:rPr>
               <a:t>Radiation Oncology</a:t>
             </a:r>
           </a:p>
@@ -11314,10 +11802,10 @@
       </p:sp>
       <p:pic>
         <p:nvPicPr>
-          <p:cNvPr id="9" name="Picture 8">
+          <p:cNvPr id="11" name="Picture 10">
             <a:extLst>
               <a:ext uri="{FF2B5EF4-FFF2-40B4-BE49-F238E27FC236}">
-                <a16:creationId xmlns:a16="http://schemas.microsoft.com/office/drawing/2014/main" id="{54C891A4-B10E-4CD3-8CA5-F6385438FDF6}"/>
+                <a16:creationId xmlns:a16="http://schemas.microsoft.com/office/drawing/2014/main" id="{5FDD34DD-9C45-4C25-B6D4-0441A49F60BE}"/>
               </a:ext>
             </a:extLst>
           </p:cNvPr>
@@ -11334,8 +11822,8 @@
         </p:blipFill>
         <p:spPr>
           <a:xfrm>
-            <a:off x="528637" y="1352550"/>
-            <a:ext cx="9001125" cy="5067300"/>
+            <a:off x="1074077" y="990600"/>
+            <a:ext cx="7910245" cy="6523285"/>
           </a:xfrm>
           <a:prstGeom prst="rect">
             <a:avLst/>
@@ -11487,12 +11975,46 @@
       </p:grpSpPr>
       <p:sp>
         <p:nvSpPr>
-          <p:cNvPr id="2" name="Title 1"/>
+          <p:cNvPr id="2" name="Title 1">
+            <a:extLst>
+              <a:ext uri="{FF2B5EF4-FFF2-40B4-BE49-F238E27FC236}">
+                <a16:creationId xmlns:a16="http://schemas.microsoft.com/office/drawing/2014/main" id="{9BFF6E51-ACB4-46AB-B620-4AF95C7691B2}"/>
+              </a:ext>
+            </a:extLst>
+          </p:cNvPr>
           <p:cNvSpPr>
             <a:spLocks noGrp="1"/>
           </p:cNvSpPr>
           <p:nvPr>
             <p:ph type="title"/>
+          </p:nvPr>
+        </p:nvSpPr>
+        <p:spPr/>
+        <p:txBody>
+          <a:bodyPr/>
+          <a:lstStyle/>
+          <a:p>
+            <a:r>
+              <a:rPr lang="en-US" dirty="0"/>
+              <a:t>Many are published as Implementation Guide</a:t>
+            </a:r>
+          </a:p>
+        </p:txBody>
+      </p:sp>
+      <p:sp>
+        <p:nvSpPr>
+          <p:cNvPr id="3" name="Content Placeholder 2">
+            <a:extLst>
+              <a:ext uri="{FF2B5EF4-FFF2-40B4-BE49-F238E27FC236}">
+                <a16:creationId xmlns:a16="http://schemas.microsoft.com/office/drawing/2014/main" id="{94C3FAAC-76C7-4F01-89BA-9D50090627DA}"/>
+              </a:ext>
+            </a:extLst>
+          </p:cNvPr>
+          <p:cNvSpPr>
+            <a:spLocks noGrp="1"/>
+          </p:cNvSpPr>
+          <p:nvPr>
+            <p:ph idx="1"/>
           </p:nvPr>
         </p:nvSpPr>
         <p:spPr/>
@@ -11502,153 +12024,275 @@
           </a:bodyPr>
           <a:lstStyle/>
           <a:p>
-            <a:r>
-              <a:rPr lang="en-US" sz="4400" dirty="0"/>
-              <a:t>IT Infrastructure Profiles</a:t>
-            </a:r>
-          </a:p>
-        </p:txBody>
-      </p:sp>
-      <p:sp>
-        <p:nvSpPr>
-          <p:cNvPr id="3" name="Subtitle 2"/>
-          <p:cNvSpPr>
-            <a:spLocks noGrp="1"/>
-          </p:cNvSpPr>
-          <p:nvPr>
-            <p:ph idx="1"/>
-          </p:nvPr>
-        </p:nvSpPr>
-        <p:spPr>
-          <a:xfrm>
-            <a:off x="691515" y="1524000"/>
-            <a:ext cx="8675370" cy="5715000"/>
-          </a:xfrm>
-        </p:spPr>
-        <p:txBody>
-          <a:bodyPr>
-            <a:normAutofit fontScale="92500"/>
-          </a:bodyPr>
+            <a:pPr algn="l">
+              <a:buFont typeface="Arial" panose="020B0604020202020204" pitchFamily="34" charset="0"/>
+              <a:buChar char="•"/>
+            </a:pPr>
+            <a:r>
+              <a:rPr lang="en-US" b="0" i="0" u="none" strike="noStrike" dirty="0">
+                <a:solidFill>
+                  <a:srgbClr val="1779BA"/>
+                </a:solidFill>
+                <a:effectLst/>
+                <a:latin typeface="Noto Serif" panose="02020600060500020200" pitchFamily="18" charset="0"/>
+                <a:hlinkClick r:id="rId2"/>
+              </a:rPr>
+              <a:t>Comprehensive </a:t>
+            </a:r>
+            <a:r>
+              <a:rPr lang="en-US" b="0" i="0" u="none" strike="noStrike" dirty="0" err="1">
+                <a:solidFill>
+                  <a:srgbClr val="1779BA"/>
+                </a:solidFill>
+                <a:effectLst/>
+                <a:latin typeface="Noto Serif" panose="02020600060500020200" pitchFamily="18" charset="0"/>
+                <a:hlinkClick r:id="rId2"/>
+              </a:rPr>
+              <a:t>FormatCode</a:t>
+            </a:r>
+            <a:r>
+              <a:rPr lang="en-US" b="0" i="0" u="none" strike="noStrike" dirty="0">
+                <a:solidFill>
+                  <a:srgbClr val="1779BA"/>
+                </a:solidFill>
+                <a:effectLst/>
+                <a:latin typeface="Noto Serif" panose="02020600060500020200" pitchFamily="18" charset="0"/>
+                <a:hlinkClick r:id="rId2"/>
+              </a:rPr>
+              <a:t> Vocabulary</a:t>
+            </a:r>
+            <a:r>
+              <a:rPr lang="en-US" b="0" i="0" dirty="0">
+                <a:solidFill>
+                  <a:srgbClr val="0A0A0A"/>
+                </a:solidFill>
+                <a:effectLst/>
+                <a:latin typeface="Noto Serif" panose="02020600060500020200" pitchFamily="18" charset="0"/>
+              </a:rPr>
+              <a:t> </a:t>
+            </a:r>
+          </a:p>
+          <a:p>
+            <a:pPr algn="l">
+              <a:buFont typeface="Arial" panose="020B0604020202020204" pitchFamily="34" charset="0"/>
+              <a:buChar char="•"/>
+            </a:pPr>
+            <a:r>
+              <a:rPr lang="en-US" dirty="0">
+                <a:solidFill>
+                  <a:srgbClr val="1779BA"/>
+                </a:solidFill>
+                <a:latin typeface="Noto Serif" panose="02020600060500020200" pitchFamily="18" charset="0"/>
+              </a:rPr>
+              <a:t>Basic Audit Log Patterns (BALP)</a:t>
+            </a:r>
+            <a:endParaRPr lang="en-US" b="0" i="0" dirty="0">
+              <a:solidFill>
+                <a:srgbClr val="0A0A0A"/>
+              </a:solidFill>
+              <a:effectLst/>
+              <a:latin typeface="Noto Serif" panose="02020600060500020200" pitchFamily="18" charset="0"/>
+            </a:endParaRPr>
+          </a:p>
+          <a:p>
+            <a:r>
+              <a:rPr lang="en-US" dirty="0">
+                <a:solidFill>
+                  <a:srgbClr val="1779BA"/>
+                </a:solidFill>
+                <a:latin typeface="Noto Serif" panose="02020600060500020200" pitchFamily="18" charset="0"/>
+              </a:rPr>
+              <a:t>Mobile Care Services Discovery (mCSD)</a:t>
+            </a:r>
+            <a:endParaRPr lang="en-US" b="0" i="0" dirty="0">
+              <a:solidFill>
+                <a:srgbClr val="0A0A0A"/>
+              </a:solidFill>
+              <a:effectLst/>
+              <a:latin typeface="Noto Serif" panose="02020600060500020200" pitchFamily="18" charset="0"/>
+            </a:endParaRPr>
+          </a:p>
+          <a:p>
+            <a:pPr algn="l">
+              <a:buFont typeface="Arial" panose="020B0604020202020204" pitchFamily="34" charset="0"/>
+              <a:buChar char="•"/>
+            </a:pPr>
+            <a:r>
+              <a:rPr lang="en-US" dirty="0">
+                <a:solidFill>
+                  <a:srgbClr val="1779BA"/>
+                </a:solidFill>
+                <a:latin typeface="Noto Serif" panose="02020600060500020200" pitchFamily="18" charset="0"/>
+              </a:rPr>
+              <a:t>Mobile Access to Health Documents (MHD)</a:t>
+            </a:r>
+            <a:endParaRPr lang="en-US" b="0" i="0" dirty="0">
+              <a:solidFill>
+                <a:srgbClr val="0A0A0A"/>
+              </a:solidFill>
+              <a:effectLst/>
+              <a:latin typeface="Noto Serif" panose="02020600060500020200" pitchFamily="18" charset="0"/>
+            </a:endParaRPr>
+          </a:p>
+          <a:p>
+            <a:pPr algn="l">
+              <a:buFont typeface="Arial" panose="020B0604020202020204" pitchFamily="34" charset="0"/>
+              <a:buChar char="•"/>
+            </a:pPr>
+            <a:r>
+              <a:rPr lang="en-US" dirty="0">
+                <a:solidFill>
+                  <a:srgbClr val="1779BA"/>
+                </a:solidFill>
+                <a:latin typeface="Noto Serif" panose="02020600060500020200" pitchFamily="18" charset="0"/>
+              </a:rPr>
+              <a:t>Mobile Health Document Sharing (MHDS) </a:t>
+            </a:r>
+            <a:endParaRPr lang="en-US" b="0" i="0" dirty="0">
+              <a:solidFill>
+                <a:srgbClr val="0A0A0A"/>
+              </a:solidFill>
+              <a:effectLst/>
+              <a:latin typeface="Noto Serif" panose="02020600060500020200" pitchFamily="18" charset="0"/>
+            </a:endParaRPr>
+          </a:p>
+          <a:p>
+            <a:pPr algn="l">
+              <a:buFont typeface="Arial" panose="020B0604020202020204" pitchFamily="34" charset="0"/>
+              <a:buChar char="•"/>
+            </a:pPr>
+            <a:r>
+              <a:rPr lang="en-US" dirty="0">
+                <a:solidFill>
+                  <a:srgbClr val="1779BA"/>
+                </a:solidFill>
+                <a:latin typeface="Noto Serif" panose="02020600060500020200" pitchFamily="18" charset="0"/>
+              </a:rPr>
+              <a:t>Patient Demographics Query for Mobile (PDQm)</a:t>
+            </a:r>
+            <a:endParaRPr lang="en-US" b="0" i="0" dirty="0">
+              <a:solidFill>
+                <a:srgbClr val="0A0A0A"/>
+              </a:solidFill>
+              <a:effectLst/>
+              <a:latin typeface="Noto Serif" panose="02020600060500020200" pitchFamily="18" charset="0"/>
+            </a:endParaRPr>
+          </a:p>
+          <a:p>
+            <a:r>
+              <a:rPr lang="en-US" dirty="0">
+                <a:solidFill>
+                  <a:srgbClr val="1779BA"/>
+                </a:solidFill>
+                <a:latin typeface="Noto Serif" panose="02020600060500020200" pitchFamily="18" charset="0"/>
+              </a:rPr>
+              <a:t>Patient Master Identity Registry (PMIR)</a:t>
+            </a:r>
+            <a:endParaRPr lang="en-US" b="0" i="0" dirty="0">
+              <a:solidFill>
+                <a:srgbClr val="0A0A0A"/>
+              </a:solidFill>
+              <a:effectLst/>
+              <a:latin typeface="Noto Serif" panose="02020600060500020200" pitchFamily="18" charset="0"/>
+            </a:endParaRPr>
+          </a:p>
+          <a:p>
+            <a:pPr algn="l">
+              <a:buFont typeface="Arial" panose="020B0604020202020204" pitchFamily="34" charset="0"/>
+              <a:buChar char="•"/>
+            </a:pPr>
+            <a:r>
+              <a:rPr lang="en-US" dirty="0">
+                <a:solidFill>
+                  <a:srgbClr val="1779BA"/>
+                </a:solidFill>
+                <a:latin typeface="Noto Serif" panose="02020600060500020200" pitchFamily="18" charset="0"/>
+              </a:rPr>
+              <a:t>Patient Identifier Cross-reference for Mobile (PIXm)</a:t>
+            </a:r>
+            <a:endParaRPr lang="en-US" b="0" i="0" dirty="0">
+              <a:solidFill>
+                <a:srgbClr val="0A0A0A"/>
+              </a:solidFill>
+              <a:effectLst/>
+              <a:latin typeface="Noto Serif" panose="02020600060500020200" pitchFamily="18" charset="0"/>
+            </a:endParaRPr>
+          </a:p>
+          <a:p>
+            <a:r>
+              <a:rPr lang="en-US" dirty="0">
+                <a:solidFill>
+                  <a:srgbClr val="1779BA"/>
+                </a:solidFill>
+                <a:latin typeface="Noto Serif" panose="02020600060500020200" pitchFamily="18" charset="0"/>
+                <a:hlinkClick r:id="rId3">
+                  <a:extLst>
+                    <a:ext uri="{A12FA001-AC4F-418D-AE19-62706E023703}">
+                      <ahyp:hlinkClr xmlns:ahyp="http://schemas.microsoft.com/office/drawing/2018/hyperlinkcolor" val="tx"/>
+                    </a:ext>
+                  </a:extLst>
+                </a:hlinkClick>
+              </a:rPr>
+              <a:t>Interactive Multimedia Report (IMR)</a:t>
+            </a:r>
+            <a:br>
+              <a:rPr lang="en-US" dirty="0"/>
+            </a:br>
+            <a:br>
+              <a:rPr lang="en-US" dirty="0"/>
+            </a:br>
+            <a:endParaRPr lang="en-US" b="1" i="0" dirty="0">
+              <a:solidFill>
+                <a:srgbClr val="0A0A0A"/>
+              </a:solidFill>
+              <a:effectLst/>
+              <a:latin typeface="Noto Sans" panose="020B0502040204020203" pitchFamily="34" charset="0"/>
+            </a:endParaRPr>
+          </a:p>
+          <a:p>
+            <a:endParaRPr lang="en-US" dirty="0"/>
+          </a:p>
+        </p:txBody>
+      </p:sp>
+      <p:sp>
+        <p:nvSpPr>
+          <p:cNvPr id="4" name="Slide Number Placeholder 3">
+            <a:extLst>
+              <a:ext uri="{FF2B5EF4-FFF2-40B4-BE49-F238E27FC236}">
+                <a16:creationId xmlns:a16="http://schemas.microsoft.com/office/drawing/2014/main" id="{9A2E5C13-F0F6-4F0F-80D7-66A3543E55EF}"/>
+              </a:ext>
+            </a:extLst>
+          </p:cNvPr>
+          <p:cNvSpPr>
+            <a:spLocks noGrp="1"/>
+          </p:cNvSpPr>
+          <p:nvPr>
+            <p:ph type="sldNum" sz="quarter" idx="12"/>
+          </p:nvPr>
+        </p:nvSpPr>
+        <p:spPr/>
+        <p:txBody>
+          <a:bodyPr/>
           <a:lstStyle/>
           <a:p>
-            <a:r>
-              <a:rPr lang="en-US" sz="2800" dirty="0"/>
-              <a:t>Audit Trail and Node Authentication (ATNA) – Feed &amp; Query</a:t>
-            </a:r>
-            <a:endParaRPr lang="en-CA" sz="2800" dirty="0"/>
-          </a:p>
-          <a:p>
-            <a:r>
-              <a:rPr lang="en-CA" sz="2800" dirty="0"/>
-              <a:t>Mobile Access to Health Documents (MHD) – API</a:t>
-            </a:r>
-          </a:p>
-          <a:p>
-            <a:r>
-              <a:rPr lang="en-US" sz="2800" i="1" dirty="0"/>
-              <a:t>Mobile Health Document Sharing (MHDS) - System</a:t>
-            </a:r>
-            <a:endParaRPr lang="en-CA" sz="2800" i="1" dirty="0"/>
-          </a:p>
-          <a:p>
-            <a:r>
-              <a:rPr lang="en-US" sz="2800" dirty="0"/>
-              <a:t>Mobile Care Services Discovery (mCSD) -</a:t>
-            </a:r>
-            <a:r>
-              <a:rPr lang="en-US" sz="2470" dirty="0"/>
-              <a:t> Provider Directory</a:t>
-            </a:r>
-          </a:p>
-          <a:p>
-            <a:r>
-              <a:rPr lang="en-US" sz="2800" dirty="0"/>
-              <a:t>Mobile Cross-Enterprise Doc Data Element Extraction (</a:t>
-            </a:r>
-            <a:r>
-              <a:rPr lang="en-US" sz="2800" dirty="0" err="1"/>
-              <a:t>mXDE</a:t>
-            </a:r>
-            <a:r>
-              <a:rPr lang="en-US" sz="2800" dirty="0"/>
-              <a:t>)</a:t>
-            </a:r>
-          </a:p>
-          <a:p>
-            <a:r>
-              <a:rPr lang="en-US" sz="2800" dirty="0"/>
-              <a:t>Non-patient File Sharing (NPFS)</a:t>
-            </a:r>
-          </a:p>
-          <a:p>
-            <a:r>
-              <a:rPr lang="en-US" sz="2800" dirty="0"/>
-              <a:t>Patient Identifier Cross-reference for Mobile (PIXm) - API</a:t>
-            </a:r>
-          </a:p>
-          <a:p>
-            <a:r>
-              <a:rPr lang="en-US" sz="2800" dirty="0"/>
-              <a:t>Patient Demographic Query for Mobile (PDQm) - API</a:t>
-            </a:r>
-          </a:p>
-          <a:p>
-            <a:r>
-              <a:rPr lang="en-US" sz="2800" dirty="0"/>
-              <a:t>Patient Master Identity Registry (PMIR) – Patient Directory </a:t>
-            </a:r>
-          </a:p>
-          <a:p>
-            <a:r>
-              <a:rPr lang="en-US" sz="2800" i="1" dirty="0"/>
-              <a:t>Sharing </a:t>
-            </a:r>
-            <a:r>
-              <a:rPr lang="en-US" sz="2800" i="1" dirty="0" err="1"/>
-              <a:t>Valuesets</a:t>
-            </a:r>
-            <a:r>
-              <a:rPr lang="en-US" sz="2800" i="1" dirty="0"/>
-              <a:t>, Codes, and Maps (SVCM) - Terminology</a:t>
-            </a:r>
-          </a:p>
-          <a:p>
-            <a:r>
-              <a:rPr lang="en-US" sz="2800" dirty="0"/>
-              <a:t>Mobile Alert Communication Management (</a:t>
-            </a:r>
-            <a:r>
-              <a:rPr lang="en-US" sz="2800" dirty="0" err="1"/>
-              <a:t>mACM</a:t>
-            </a:r>
-            <a:r>
-              <a:rPr lang="en-US" sz="2800" dirty="0"/>
-              <a:t>)</a:t>
-            </a:r>
-          </a:p>
-          <a:p>
-            <a:r>
-              <a:rPr lang="en-US" sz="2800" dirty="0"/>
-              <a:t>Internet User Authentication (IUA) </a:t>
-            </a:r>
-            <a:r>
-              <a:rPr lang="mr-IN" sz="2800" dirty="0"/>
-              <a:t>–</a:t>
-            </a:r>
-            <a:r>
-              <a:rPr lang="en-US" sz="2800" dirty="0"/>
-              <a:t> Special Mention</a:t>
-            </a:r>
-          </a:p>
-          <a:p>
-            <a:endParaRPr lang="en-US" sz="2800" dirty="0"/>
+            <a:pPr>
+              <a:defRPr/>
+            </a:pPr>
+            <a:fld id="{336892F5-F7A2-420A-8BF3-D2A2054912B1}" type="slidenum">
+              <a:rPr lang="en-US" smtClean="0"/>
+              <a:pPr>
+                <a:defRPr/>
+              </a:pPr>
+              <a:t>7</a:t>
+            </a:fld>
+            <a:endParaRPr lang="en-US"/>
           </a:p>
         </p:txBody>
       </p:sp>
     </p:spTree>
     <p:extLst>
       <p:ext uri="{BB962C8B-B14F-4D97-AF65-F5344CB8AC3E}">
-        <p14:creationId xmlns:p14="http://schemas.microsoft.com/office/powerpoint/2010/main" val="2678714911"/>
+        <p14:creationId xmlns:p14="http://schemas.microsoft.com/office/powerpoint/2010/main" val="2248904350"/>
       </p:ext>
     </p:extLst>
   </p:cSld>
@@ -11677,13 +12321,7 @@
       </p:grpSpPr>
       <p:sp>
         <p:nvSpPr>
-          <p:cNvPr id="2" name="Title 1">
-            <a:extLst>
-              <a:ext uri="{FF2B5EF4-FFF2-40B4-BE49-F238E27FC236}">
-                <a16:creationId xmlns:a16="http://schemas.microsoft.com/office/drawing/2014/main" id="{75FAA31F-2BE9-407C-B9D8-75DD14D1AA22}"/>
-              </a:ext>
-            </a:extLst>
-          </p:cNvPr>
+          <p:cNvPr id="2" name="Title 1"/>
           <p:cNvSpPr>
             <a:spLocks noGrp="1"/>
           </p:cNvSpPr>
@@ -11700,20 +12338,14 @@
           <a:p>
             <a:r>
               <a:rPr lang="en-US" sz="4400" dirty="0"/>
-              <a:t>Appendix Z on FHIR</a:t>
-            </a:r>
-          </a:p>
-        </p:txBody>
-      </p:sp>
-      <p:sp>
-        <p:nvSpPr>
-          <p:cNvPr id="3" name="Content Placeholder 2">
-            <a:extLst>
-              <a:ext uri="{FF2B5EF4-FFF2-40B4-BE49-F238E27FC236}">
-                <a16:creationId xmlns:a16="http://schemas.microsoft.com/office/drawing/2014/main" id="{C0440480-4A9B-4D9C-9EE3-9EA5E3CDD408}"/>
-              </a:ext>
-            </a:extLst>
-          </p:cNvPr>
+              <a:t>IT Infrastructure Profiles</a:t>
+            </a:r>
+          </a:p>
+        </p:txBody>
+      </p:sp>
+      <p:sp>
+        <p:nvSpPr>
+          <p:cNvPr id="3" name="Subtitle 2"/>
           <p:cNvSpPr>
             <a:spLocks noGrp="1"/>
           </p:cNvSpPr>
@@ -11721,73 +12353,142 @@
             <p:ph idx="1"/>
           </p:nvPr>
         </p:nvSpPr>
-        <p:spPr/>
+        <p:spPr>
+          <a:xfrm>
+            <a:off x="691515" y="1524000"/>
+            <a:ext cx="8675370" cy="5715000"/>
+          </a:xfrm>
+        </p:spPr>
         <p:txBody>
           <a:bodyPr>
-            <a:normAutofit/>
+            <a:normAutofit fontScale="92500" lnSpcReduction="10000"/>
           </a:bodyPr>
           <a:lstStyle/>
           <a:p>
             <a:r>
               <a:rPr lang="en-US" sz="2800" dirty="0"/>
-              <a:t>Common text for all IHE Domains to re-use</a:t>
+              <a:t>Audit Trail and Node Authentication (ATNA) – Feed &amp; Query</a:t>
+            </a:r>
+            <a:endParaRPr lang="en-CA" sz="2800" dirty="0"/>
+          </a:p>
+          <a:p>
+            <a:r>
+              <a:rPr lang="en-CA" sz="2800" dirty="0"/>
+              <a:t>Basic AuditEvent Log Patterns (BALP) – audit logging</a:t>
+            </a:r>
+          </a:p>
+          <a:p>
+            <a:r>
+              <a:rPr lang="en-CA" sz="2800" dirty="0"/>
+              <a:t>Mobile Access to Health Documents (MHD) – API</a:t>
             </a:r>
           </a:p>
           <a:p>
             <a:r>
               <a:rPr lang="en-US" sz="2800" dirty="0"/>
-              <a:t>Introduction to FHIR profiling concepts </a:t>
-            </a:r>
+              <a:t>Mobile Health Document Sharing (MHDS) - System</a:t>
+            </a:r>
+            <a:endParaRPr lang="en-CA" sz="2800" dirty="0"/>
           </a:p>
           <a:p>
             <a:r>
               <a:rPr lang="en-US" sz="2800" dirty="0"/>
-              <a:t>Common query parameter clarifications</a:t>
+              <a:t>Mobile Care Services Discovery (mCSD) -</a:t>
+            </a:r>
+            <a:r>
+              <a:rPr lang="en-US" sz="2470" dirty="0"/>
+              <a:t> Provider Directory</a:t>
             </a:r>
           </a:p>
           <a:p>
             <a:r>
               <a:rPr lang="en-US" sz="2800" dirty="0"/>
-              <a:t>Relationship between </a:t>
+              <a:t>Mobile Cross-Enterprise Doc Data Element Extraction (</a:t>
             </a:r>
             <a:r>
               <a:rPr lang="en-US" sz="2800" dirty="0" err="1"/>
-              <a:t>CapabilityStatement</a:t>
+              <a:t>mXDE</a:t>
             </a:r>
             <a:r>
               <a:rPr lang="en-US" sz="2800" dirty="0"/>
-              <a:t> and IHE Integration Statement</a:t>
+              <a:t>)</a:t>
             </a:r>
           </a:p>
           <a:p>
             <a:r>
               <a:rPr lang="en-US" sz="2800" dirty="0"/>
-              <a:t>Pointer to library of conformance resources</a:t>
+              <a:t>Non-patient File Sharing (NPFS)</a:t>
             </a:r>
           </a:p>
           <a:p>
             <a:r>
               <a:rPr lang="en-US" sz="2800" dirty="0"/>
-              <a:t>Mapping of FHIR Identifier datatype to HL7 v3 root, and XDS </a:t>
+              <a:t>Patient Identifier Cross-reference for Mobile (PIXm) - API</a:t>
+            </a:r>
+          </a:p>
+          <a:p>
+            <a:r>
+              <a:rPr lang="en-US" sz="2800" dirty="0"/>
+              <a:t>Patient Demographic Query for Mobile (PDQm) - API</a:t>
+            </a:r>
+          </a:p>
+          <a:p>
+            <a:r>
+              <a:rPr lang="en-US" sz="2800" dirty="0"/>
+              <a:t>Patient Master Identity Registry (PMIR) – Patient Directory </a:t>
+            </a:r>
+          </a:p>
+          <a:p>
+            <a:r>
+              <a:rPr lang="en-US" sz="2800" dirty="0"/>
+              <a:t>Sharing </a:t>
             </a:r>
             <a:r>
               <a:rPr lang="en-US" sz="2800" dirty="0" err="1"/>
-              <a:t>Cxi</a:t>
-            </a:r>
+              <a:t>Valuesets</a:t>
+            </a:r>
+            <a:r>
+              <a:rPr lang="en-US" sz="2800" dirty="0"/>
+              <a:t>, Codes, and Maps (SVCM) - Terminology</a:t>
+            </a:r>
+          </a:p>
+          <a:p>
+            <a:r>
+              <a:rPr lang="en-US" sz="2800" dirty="0"/>
+              <a:t>Mobile Alert Communication Management (</a:t>
+            </a:r>
+            <a:r>
+              <a:rPr lang="en-US" sz="2800" dirty="0" err="1"/>
+              <a:t>mACM</a:t>
+            </a:r>
+            <a:r>
+              <a:rPr lang="en-US" sz="2800" dirty="0"/>
+              <a:t>)</a:t>
+            </a:r>
+          </a:p>
+          <a:p>
+            <a:r>
+              <a:rPr lang="en-US" sz="2800" dirty="0"/>
+              <a:t>Internet User Authentication (IUA) </a:t>
+            </a:r>
+            <a:r>
+              <a:rPr lang="mr-IN" sz="2800" dirty="0"/>
+              <a:t>–</a:t>
+            </a:r>
+            <a:r>
+              <a:rPr lang="en-US" sz="2800" dirty="0"/>
+              <a:t> Special Mention</a:t>
+            </a:r>
+          </a:p>
+          <a:p>
             <a:endParaRPr lang="en-US" sz="2800" dirty="0"/>
-          </a:p>
-          <a:p>
-            <a:r>
-              <a:rPr lang="en-US" sz="2800" dirty="0"/>
-              <a:t>Security Considerations</a:t>
-            </a:r>
           </a:p>
         </p:txBody>
       </p:sp>
     </p:spTree>
     <p:extLst>
       <p:ext uri="{BB962C8B-B14F-4D97-AF65-F5344CB8AC3E}">
-        <p14:creationId xmlns:p14="http://schemas.microsoft.com/office/powerpoint/2010/main" val="1023103778"/>
+        <p14:creationId xmlns:p14="http://schemas.microsoft.com/office/powerpoint/2010/main" val="2678714911"/>
       </p:ext>
     </p:extLst>
   </p:cSld>
@@ -11816,7 +12517,13 @@
       </p:grpSpPr>
       <p:sp>
         <p:nvSpPr>
-          <p:cNvPr id="5" name="Title 4"/>
+          <p:cNvPr id="2" name="Title 1">
+            <a:extLst>
+              <a:ext uri="{FF2B5EF4-FFF2-40B4-BE49-F238E27FC236}">
+                <a16:creationId xmlns:a16="http://schemas.microsoft.com/office/drawing/2014/main" id="{75FAA31F-2BE9-407C-B9D8-75DD14D1AA22}"/>
+              </a:ext>
+            </a:extLst>
+          </p:cNvPr>
           <p:cNvSpPr>
             <a:spLocks noGrp="1"/>
           </p:cNvSpPr>
@@ -11833,14 +12540,20 @@
           <a:p>
             <a:r>
               <a:rPr lang="en-US" sz="4400" dirty="0"/>
-              <a:t>Patient Care Coordination </a:t>
-            </a:r>
-          </a:p>
-        </p:txBody>
-      </p:sp>
-      <p:sp>
-        <p:nvSpPr>
-          <p:cNvPr id="2" name="Content Placeholder 1"/>
+              <a:t>Appendix Z on FHIR</a:t>
+            </a:r>
+          </a:p>
+        </p:txBody>
+      </p:sp>
+      <p:sp>
+        <p:nvSpPr>
+          <p:cNvPr id="3" name="Content Placeholder 2">
+            <a:extLst>
+              <a:ext uri="{FF2B5EF4-FFF2-40B4-BE49-F238E27FC236}">
+                <a16:creationId xmlns:a16="http://schemas.microsoft.com/office/drawing/2014/main" id="{C0440480-4A9B-4D9C-9EE3-9EA5E3CDD408}"/>
+              </a:ext>
+            </a:extLst>
+          </p:cNvPr>
           <p:cNvSpPr>
             <a:spLocks noGrp="1"/>
           </p:cNvSpPr>
@@ -11851,100 +12564,70 @@
         <p:spPr/>
         <p:txBody>
           <a:bodyPr>
-            <a:normAutofit lnSpcReduction="10000"/>
+            <a:normAutofit/>
           </a:bodyPr>
           <a:lstStyle/>
           <a:p>
             <a:r>
-              <a:rPr lang="en-US" sz="2800" i="1" dirty="0"/>
-              <a:t>Assessment Curation and Data Collection (ACDC)</a:t>
-            </a:r>
-          </a:p>
-          <a:p>
-            <a:r>
-              <a:rPr lang="en-US" sz="2800" strike="sngStrike" dirty="0"/>
-              <a:t>Clinical Mapping (CMAP) </a:t>
-            </a:r>
-            <a:r>
-              <a:rPr lang="en-US" sz="2800" dirty="0">
-                <a:sym typeface="Wingdings" panose="05000000000000000000" pitchFamily="2" charset="2"/>
-              </a:rPr>
-              <a:t> See ITI SVCM</a:t>
+              <a:rPr lang="en-US" sz="2800" dirty="0"/>
+              <a:t>Common text for all IHE Domains to re-use</a:t>
+            </a:r>
+          </a:p>
+          <a:p>
+            <a:r>
+              <a:rPr lang="en-US" sz="2800" dirty="0"/>
+              <a:t>Introduction to FHIR profiling concepts </a:t>
+            </a:r>
+          </a:p>
+          <a:p>
+            <a:r>
+              <a:rPr lang="en-US" sz="2800" dirty="0"/>
+              <a:t>Common query parameter clarifications</a:t>
+            </a:r>
+          </a:p>
+          <a:p>
+            <a:r>
+              <a:rPr lang="en-US" sz="2800" dirty="0"/>
+              <a:t>Relationship between </a:t>
+            </a:r>
+            <a:r>
+              <a:rPr lang="en-US" sz="2800" dirty="0" err="1"/>
+              <a:t>CapabilityStatement</a:t>
+            </a:r>
+            <a:r>
+              <a:rPr lang="en-US" sz="2800" dirty="0"/>
+              <a:t> and IHE Integration Statement</a:t>
+            </a:r>
+          </a:p>
+          <a:p>
+            <a:r>
+              <a:rPr lang="en-US" sz="2800" dirty="0"/>
+              <a:t>Pointer to library of conformance resources</a:t>
+            </a:r>
+          </a:p>
+          <a:p>
+            <a:r>
+              <a:rPr lang="en-US" sz="2800" dirty="0"/>
+              <a:t>Mapping of FHIR Identifier datatype to HL7 v3 root, and XDS </a:t>
+            </a:r>
+            <a:r>
+              <a:rPr lang="en-US" sz="2800" dirty="0" err="1"/>
+              <a:t>Cxi</a:t>
             </a:r>
             <a:endParaRPr lang="en-US" sz="2800" dirty="0"/>
           </a:p>
           <a:p>
             <a:r>
               <a:rPr lang="en-US" sz="2800" dirty="0"/>
-              <a:t>Dynamic Care Planning (DCP)</a:t>
-            </a:r>
-          </a:p>
-          <a:p>
-            <a:r>
-              <a:rPr lang="en-US" sz="2800" i="1" dirty="0"/>
-              <a:t>Dynamic Care Team Management (DCTM)</a:t>
-            </a:r>
-          </a:p>
-          <a:p>
-            <a:r>
-              <a:rPr lang="en-US" sz="2800" dirty="0"/>
-              <a:t>Guideline Appropriate Ordering (GAO)</a:t>
-            </a:r>
-          </a:p>
-          <a:p>
-            <a:r>
-              <a:rPr lang="en-US" sz="2800" dirty="0"/>
-              <a:t>Paramedicine Care Summary (PCS)</a:t>
-            </a:r>
-          </a:p>
-          <a:p>
-            <a:r>
-              <a:rPr lang="en-US" sz="2800" dirty="0"/>
-              <a:t>Point of Care Medical Device Tracking (PMDT) </a:t>
-            </a:r>
-          </a:p>
-          <a:p>
-            <a:r>
-              <a:rPr lang="en-US" sz="2800" dirty="0"/>
-              <a:t>Query for Existing Data for Mobile (QEDm) </a:t>
-            </a:r>
-          </a:p>
-          <a:p>
-            <a:r>
-              <a:rPr lang="en-US" sz="2800" dirty="0"/>
-              <a:t>Reconciliation of Clinical Content and Care Providers (RECON) </a:t>
-            </a:r>
-          </a:p>
-          <a:p>
-            <a:r>
-              <a:rPr lang="en-US" sz="2800" dirty="0"/>
-              <a:t>Routine Interfacility Patient Transport (RIPT)</a:t>
-            </a:r>
-          </a:p>
-          <a:p>
-            <a:endParaRPr lang="en-US" sz="2800" dirty="0"/>
-          </a:p>
-          <a:p>
-            <a:endParaRPr lang="en-US" sz="2800" dirty="0"/>
-          </a:p>
-          <a:p>
-            <a:endParaRPr lang="en-US" sz="2800" dirty="0"/>
-          </a:p>
-          <a:p>
-            <a:endParaRPr lang="en-US" sz="2800" dirty="0"/>
-          </a:p>
-          <a:p>
-            <a:endParaRPr lang="en-US" sz="2800" dirty="0"/>
-          </a:p>
-          <a:p>
-            <a:endParaRPr lang="en-US" sz="2800" dirty="0"/>
+              <a:t>Security Considerations</a:t>
+            </a:r>
           </a:p>
         </p:txBody>
       </p:sp>
     </p:spTree>
     <p:extLst>
       <p:ext uri="{BB962C8B-B14F-4D97-AF65-F5344CB8AC3E}">
-        <p14:creationId xmlns:p14="http://schemas.microsoft.com/office/powerpoint/2010/main" val="3830578867"/>
+        <p14:creationId xmlns:p14="http://schemas.microsoft.com/office/powerpoint/2010/main" val="1023103778"/>
       </p:ext>
     </p:extLst>
   </p:cSld>

</xml_diff>

<commit_message>
remove auto advancing timer
</commit_message>
<xml_diff>
--- a/Presentations/IHE-FHIR-Brief.pptx
+++ b/Presentations/IHE-FHIR-Brief.pptx
@@ -4185,7 +4185,7 @@
             <a:fld id="{B5FB3126-25FB-F241-9D08-EF0C3CBFF311}" type="datetimeFigureOut">
               <a:rPr lang="en-US" smtClean="0"/>
               <a:pPr/>
-              <a:t>6/18/2025</a:t>
+              <a:t>6/19/2025</a:t>
             </a:fld>
             <a:endParaRPr lang="en-US"/>
           </a:p>
@@ -4355,7 +4355,7 @@
             <a:fld id="{B5FB3126-25FB-F241-9D08-EF0C3CBFF311}" type="datetimeFigureOut">
               <a:rPr lang="en-US" smtClean="0"/>
               <a:pPr/>
-              <a:t>6/18/2025</a:t>
+              <a:t>6/19/2025</a:t>
             </a:fld>
             <a:endParaRPr lang="en-US"/>
           </a:p>
@@ -4535,7 +4535,7 @@
             <a:fld id="{B5FB3126-25FB-F241-9D08-EF0C3CBFF311}" type="datetimeFigureOut">
               <a:rPr lang="en-US" smtClean="0"/>
               <a:pPr/>
-              <a:t>6/18/2025</a:t>
+              <a:t>6/19/2025</a:t>
             </a:fld>
             <a:endParaRPr lang="en-US"/>
           </a:p>
@@ -4685,7 +4685,7 @@
             <a:fld id="{B5FB3126-25FB-F241-9D08-EF0C3CBFF311}" type="datetimeFigureOut">
               <a:rPr lang="en-US" smtClean="0"/>
               <a:pPr/>
-              <a:t>6/18/2025</a:t>
+              <a:t>6/19/2025</a:t>
             </a:fld>
             <a:endParaRPr lang="en-US"/>
           </a:p>
@@ -4855,7 +4855,7 @@
             <a:fld id="{B5FB3126-25FB-F241-9D08-EF0C3CBFF311}" type="datetimeFigureOut">
               <a:rPr lang="en-US" smtClean="0"/>
               <a:pPr/>
-              <a:t>6/18/2025</a:t>
+              <a:t>6/19/2025</a:t>
             </a:fld>
             <a:endParaRPr lang="en-US"/>
           </a:p>
@@ -5102,7 +5102,7 @@
             <a:fld id="{B5FB3126-25FB-F241-9D08-EF0C3CBFF311}" type="datetimeFigureOut">
               <a:rPr lang="en-US" smtClean="0"/>
               <a:pPr/>
-              <a:t>6/18/2025</a:t>
+              <a:t>6/19/2025</a:t>
             </a:fld>
             <a:endParaRPr lang="en-US"/>
           </a:p>
@@ -5389,7 +5389,7 @@
             <a:fld id="{B5FB3126-25FB-F241-9D08-EF0C3CBFF311}" type="datetimeFigureOut">
               <a:rPr lang="en-US" smtClean="0"/>
               <a:pPr/>
-              <a:t>6/18/2025</a:t>
+              <a:t>6/19/2025</a:t>
             </a:fld>
             <a:endParaRPr lang="en-US"/>
           </a:p>
@@ -5810,7 +5810,7 @@
             <a:fld id="{B5FB3126-25FB-F241-9D08-EF0C3CBFF311}" type="datetimeFigureOut">
               <a:rPr lang="en-US" smtClean="0"/>
               <a:pPr/>
-              <a:t>6/18/2025</a:t>
+              <a:t>6/19/2025</a:t>
             </a:fld>
             <a:endParaRPr lang="en-US"/>
           </a:p>
@@ -5929,7 +5929,7 @@
             <a:fld id="{B5FB3126-25FB-F241-9D08-EF0C3CBFF311}" type="datetimeFigureOut">
               <a:rPr lang="en-US" smtClean="0"/>
               <a:pPr/>
-              <a:t>6/18/2025</a:t>
+              <a:t>6/19/2025</a:t>
             </a:fld>
             <a:endParaRPr lang="en-US"/>
           </a:p>
@@ -6026,7 +6026,7 @@
             <a:fld id="{B5FB3126-25FB-F241-9D08-EF0C3CBFF311}" type="datetimeFigureOut">
               <a:rPr lang="en-US" smtClean="0"/>
               <a:pPr/>
-              <a:t>6/18/2025</a:t>
+              <a:t>6/19/2025</a:t>
             </a:fld>
             <a:endParaRPr lang="en-US"/>
           </a:p>
@@ -6303,7 +6303,7 @@
             <a:fld id="{B5FB3126-25FB-F241-9D08-EF0C3CBFF311}" type="datetimeFigureOut">
               <a:rPr lang="en-US" smtClean="0"/>
               <a:pPr/>
-              <a:t>6/18/2025</a:t>
+              <a:t>6/19/2025</a:t>
             </a:fld>
             <a:endParaRPr lang="en-US"/>
           </a:p>
@@ -6557,7 +6557,7 @@
             <a:fld id="{B5FB3126-25FB-F241-9D08-EF0C3CBFF311}" type="datetimeFigureOut">
               <a:rPr lang="en-US" smtClean="0"/>
               <a:pPr/>
-              <a:t>6/18/2025</a:t>
+              <a:t>6/19/2025</a:t>
             </a:fld>
             <a:endParaRPr lang="en-US"/>
           </a:p>
@@ -6804,7 +6804,7 @@
             <a:fld id="{B5FB3126-25FB-F241-9D08-EF0C3CBFF311}" type="datetimeFigureOut">
               <a:rPr lang="en-US" smtClean="0"/>
               <a:pPr/>
-              <a:t>6/18/2025</a:t>
+              <a:t>6/19/2025</a:t>
             </a:fld>
             <a:endParaRPr lang="en-US"/>
           </a:p>
@@ -7390,14 +7390,6 @@
   <p:clrMapOvr>
     <a:masterClrMapping/>
   </p:clrMapOvr>
-  <mc:AlternateContent xmlns:mc="http://schemas.openxmlformats.org/markup-compatibility/2006" xmlns:p14="http://schemas.microsoft.com/office/powerpoint/2010/main">
-    <mc:Choice Requires="p14">
-      <p:transition spd="slow" p14:dur="2000" advTm="13013"/>
-    </mc:Choice>
-    <mc:Fallback xmlns="">
-      <p:transition spd="slow" advTm="13013"/>
-    </mc:Fallback>
-  </mc:AlternateContent>
 </p:sld>
 </file>
 
@@ -7537,14 +7529,6 @@
   <p:clrMapOvr>
     <a:masterClrMapping/>
   </p:clrMapOvr>
-  <mc:AlternateContent xmlns:mc="http://schemas.openxmlformats.org/markup-compatibility/2006" xmlns:p14="http://schemas.microsoft.com/office/powerpoint/2010/main">
-    <mc:Choice Requires="p14">
-      <p:transition spd="slow" p14:dur="2000" advTm="59104"/>
-    </mc:Choice>
-    <mc:Fallback xmlns="">
-      <p:transition spd="slow" advTm="59104"/>
-    </mc:Fallback>
-  </mc:AlternateContent>
 </p:sld>
 </file>
 
@@ -7777,14 +7761,6 @@
   <p:clrMapOvr>
     <a:masterClrMapping/>
   </p:clrMapOvr>
-  <mc:AlternateContent xmlns:mc="http://schemas.openxmlformats.org/markup-compatibility/2006" xmlns:p14="http://schemas.microsoft.com/office/powerpoint/2010/main">
-    <mc:Choice Requires="p14">
-      <p:transition spd="slow" p14:dur="2000" advTm="84669"/>
-    </mc:Choice>
-    <mc:Fallback xmlns="">
-      <p:transition spd="slow" advTm="84669"/>
-    </mc:Fallback>
-  </mc:AlternateContent>
 </p:sld>
 </file>
 
@@ -7908,14 +7884,6 @@
   <p:clrMapOvr>
     <a:masterClrMapping/>
   </p:clrMapOvr>
-  <mc:AlternateContent xmlns:mc="http://schemas.openxmlformats.org/markup-compatibility/2006" xmlns:p14="http://schemas.microsoft.com/office/powerpoint/2010/main">
-    <mc:Choice Requires="p14">
-      <p:transition spd="slow" p14:dur="2000" advTm="18006"/>
-    </mc:Choice>
-    <mc:Fallback xmlns="">
-      <p:transition spd="slow" advTm="18006"/>
-    </mc:Fallback>
-  </mc:AlternateContent>
 </p:sld>
 </file>
 
@@ -8037,14 +8005,6 @@
   <p:clrMapOvr>
     <a:masterClrMapping/>
   </p:clrMapOvr>
-  <mc:AlternateContent xmlns:mc="http://schemas.openxmlformats.org/markup-compatibility/2006" xmlns:p14="http://schemas.microsoft.com/office/powerpoint/2010/main">
-    <mc:Choice Requires="p14">
-      <p:transition spd="slow" p14:dur="2000" advTm="9553"/>
-    </mc:Choice>
-    <mc:Fallback xmlns="">
-      <p:transition spd="slow" advTm="9553"/>
-    </mc:Fallback>
-  </mc:AlternateContent>
 </p:sld>
 </file>
 
@@ -8156,14 +8116,6 @@
   <p:clrMapOvr>
     <a:masterClrMapping/>
   </p:clrMapOvr>
-  <mc:AlternateContent xmlns:mc="http://schemas.openxmlformats.org/markup-compatibility/2006" xmlns:p14="http://schemas.microsoft.com/office/powerpoint/2010/main">
-    <mc:Choice Requires="p14">
-      <p:transition spd="slow" p14:dur="2000" advTm="13058"/>
-    </mc:Choice>
-    <mc:Fallback xmlns="">
-      <p:transition spd="slow" advTm="13058"/>
-    </mc:Fallback>
-  </mc:AlternateContent>
 </p:sld>
 </file>
 
@@ -8336,14 +8288,6 @@
   <p:clrMapOvr>
     <a:masterClrMapping/>
   </p:clrMapOvr>
-  <mc:AlternateContent xmlns:mc="http://schemas.openxmlformats.org/markup-compatibility/2006" xmlns:p14="http://schemas.microsoft.com/office/powerpoint/2010/main">
-    <mc:Choice Requires="p14">
-      <p:transition spd="slow" p14:dur="2000" advTm="47819"/>
-    </mc:Choice>
-    <mc:Fallback xmlns="">
-      <p:transition spd="slow" advTm="47819"/>
-    </mc:Fallback>
-  </mc:AlternateContent>
 </p:sld>
 </file>
 
@@ -8540,14 +8484,6 @@
   <p:clrMapOvr>
     <a:masterClrMapping/>
   </p:clrMapOvr>
-  <mc:AlternateContent xmlns:mc="http://schemas.openxmlformats.org/markup-compatibility/2006" xmlns:p14="http://schemas.microsoft.com/office/powerpoint/2010/main">
-    <mc:Choice Requires="p14">
-      <p:transition spd="slow" p14:dur="2000" advTm="61217"/>
-    </mc:Choice>
-    <mc:Fallback xmlns="">
-      <p:transition spd="slow" advTm="61217"/>
-    </mc:Fallback>
-  </mc:AlternateContent>
 </p:sld>
 </file>
 
@@ -8756,14 +8692,6 @@
   <p:clrMapOvr>
     <a:masterClrMapping/>
   </p:clrMapOvr>
-  <mc:AlternateContent xmlns:mc="http://schemas.openxmlformats.org/markup-compatibility/2006" xmlns:p14="http://schemas.microsoft.com/office/powerpoint/2010/main">
-    <mc:Choice Requires="p14">
-      <p:transition spd="slow" p14:dur="2000" advTm="100459"/>
-    </mc:Choice>
-    <mc:Fallback xmlns="">
-      <p:transition spd="slow" advTm="100459"/>
-    </mc:Fallback>
-  </mc:AlternateContent>
 </p:sld>
 </file>
 
@@ -8915,14 +8843,6 @@
   <p:clrMapOvr>
     <a:masterClrMapping/>
   </p:clrMapOvr>
-  <mc:AlternateContent xmlns:mc="http://schemas.openxmlformats.org/markup-compatibility/2006" xmlns:p14="http://schemas.microsoft.com/office/powerpoint/2010/main">
-    <mc:Choice Requires="p14">
-      <p:transition spd="slow" p14:dur="2000" advTm="22393"/>
-    </mc:Choice>
-    <mc:Fallback xmlns="">
-      <p:transition spd="slow" advTm="22393"/>
-    </mc:Fallback>
-  </mc:AlternateContent>
 </p:sld>
 </file>
 
@@ -9187,14 +9107,6 @@
   <p:clrMapOvr>
     <a:masterClrMapping/>
   </p:clrMapOvr>
-  <mc:AlternateContent xmlns:mc="http://schemas.openxmlformats.org/markup-compatibility/2006" xmlns:p14="http://schemas.microsoft.com/office/powerpoint/2010/main">
-    <mc:Choice Requires="p14">
-      <p:transition spd="slow" p14:dur="2000" advTm="25202"/>
-    </mc:Choice>
-    <mc:Fallback xmlns="">
-      <p:transition spd="slow" advTm="25202"/>
-    </mc:Fallback>
-  </mc:AlternateContent>
 </p:sld>
 </file>
 
@@ -9389,14 +9301,6 @@
   <p:clrMapOvr>
     <a:masterClrMapping/>
   </p:clrMapOvr>
-  <mc:AlternateContent xmlns:mc="http://schemas.openxmlformats.org/markup-compatibility/2006" xmlns:p14="http://schemas.microsoft.com/office/powerpoint/2010/main">
-    <mc:Choice Requires="p14">
-      <p:transition spd="slow" p14:dur="2000" advTm="11060"/>
-    </mc:Choice>
-    <mc:Fallback xmlns="">
-      <p:transition spd="slow" advTm="11060"/>
-    </mc:Fallback>
-  </mc:AlternateContent>
 </p:sld>
 </file>
 
@@ -10104,14 +10008,6 @@
   <p:clrMapOvr>
     <a:masterClrMapping/>
   </p:clrMapOvr>
-  <mc:AlternateContent xmlns:mc="http://schemas.openxmlformats.org/markup-compatibility/2006" xmlns:p14="http://schemas.microsoft.com/office/powerpoint/2010/main">
-    <mc:Choice Requires="p14">
-      <p:transition spd="slow" p14:dur="2000" advTm="73419"/>
-    </mc:Choice>
-    <mc:Fallback xmlns="">
-      <p:transition spd="slow" advTm="73419"/>
-    </mc:Fallback>
-  </mc:AlternateContent>
 </p:sld>
 </file>
 
@@ -10210,14 +10106,6 @@
   <p:clrMapOvr>
     <a:masterClrMapping/>
   </p:clrMapOvr>
-  <mc:AlternateContent xmlns:mc="http://schemas.openxmlformats.org/markup-compatibility/2006" xmlns:p14="http://schemas.microsoft.com/office/powerpoint/2010/main">
-    <mc:Choice Requires="p14">
-      <p:transition spd="slow" p14:dur="2000" advTm="31542"/>
-    </mc:Choice>
-    <mc:Fallback xmlns="">
-      <p:transition spd="slow" advTm="31542"/>
-    </mc:Fallback>
-  </mc:AlternateContent>
 </p:sld>
 </file>
 
@@ -10306,14 +10194,6 @@
   <p:clrMapOvr>
     <a:masterClrMapping/>
   </p:clrMapOvr>
-  <mc:AlternateContent xmlns:mc="http://schemas.openxmlformats.org/markup-compatibility/2006" xmlns:p14="http://schemas.microsoft.com/office/powerpoint/2010/main">
-    <mc:Choice Requires="p14">
-      <p:transition spd="slow" p14:dur="2000" advTm="16472"/>
-    </mc:Choice>
-    <mc:Fallback xmlns="">
-      <p:transition spd="slow" advTm="16472"/>
-    </mc:Fallback>
-  </mc:AlternateContent>
 </p:sld>
 </file>
 
@@ -10708,14 +10588,6 @@
   <p:clrMapOvr>
     <a:masterClrMapping/>
   </p:clrMapOvr>
-  <mc:AlternateContent xmlns:mc="http://schemas.openxmlformats.org/markup-compatibility/2006" xmlns:p14="http://schemas.microsoft.com/office/powerpoint/2010/main">
-    <mc:Choice Requires="p14">
-      <p:transition spd="slow" p14:dur="2000" advTm="43872"/>
-    </mc:Choice>
-    <mc:Fallback xmlns="">
-      <p:transition spd="slow" advTm="43872"/>
-    </mc:Fallback>
-  </mc:AlternateContent>
 </p:sld>
 </file>
 
@@ -11194,14 +11066,6 @@
   <p:clrMapOvr>
     <a:masterClrMapping/>
   </p:clrMapOvr>
-  <mc:AlternateContent xmlns:mc="http://schemas.openxmlformats.org/markup-compatibility/2006" xmlns:p14="http://schemas.microsoft.com/office/powerpoint/2010/main">
-    <mc:Choice Requires="p14">
-      <p:transition spd="slow" p14:dur="2000" advTm="252271"/>
-    </mc:Choice>
-    <mc:Fallback xmlns="">
-      <p:transition spd="slow" advTm="252271"/>
-    </mc:Fallback>
-  </mc:AlternateContent>
 </p:sld>
 </file>
 

</xml_diff>